<commit_message>
Revised Introduction to R homework2a, 2b files
</commit_message>
<xml_diff>
--- a/clinical-research-methodology/results/video04-randomized-trials.pptx
+++ b/clinical-research-methodology/results/video04-randomized-trials.pptx
@@ -5,7 +5,7 @@
     <p:sldMasterId id="2147483648" r:id="rId1"/>
   </p:sldMasterIdLst>
   <p:notesMasterIdLst>
-    <p:NotesMasterId r:id="rId29"/>
+    <p:NotesMasterId r:id="rId34"/>
   </p:notesMasterIdLst>
   <p:sldIdLst>
     <p:sldId id="256" r:id="rId2"/>
@@ -35,6 +35,11 @@
     <p:sldId id="280" r:id="rId26"/>
     <p:sldId id="281" r:id="rId27"/>
     <p:sldId id="282" r:id="rId28"/>
+    <p:sldId id="283" r:id="rId29"/>
+    <p:sldId id="284" r:id="rId30"/>
+    <p:sldId id="285" r:id="rId31"/>
+    <p:sldId id="286" r:id="rId32"/>
+    <p:sldId id="287" r:id="rId33"/>
   </p:sldIdLst>
   <p:sldSz cx="9144000" cy="6858000" type="screen4x3"/>
   <p:notesSz cx="6858000" cy="9144000"/>
@@ -234,7 +239,7 @@
           <a:p>
             <a:fld id="{0F9C1CCF-B725-44A7-AA57-5E433BD85C9F}" type="datetimeFigureOut">
               <a:rPr lang="en-US" smtClean="0"/>
-              <a:t>12/30/2018</a:t>
+              <a:t>4/5/2019</a:t>
             </a:fld>
             <a:endParaRPr lang="en-US"/>
           </a:p>
@@ -298,37 +303,38 @@
           <a:p>
             <a:pPr lvl="0"/>
             <a:r>
-              <a:rPr lang="en-US"/>
+              <a:rPr lang="en-US" smtClean="0"/>
               <a:t>Click to edit Master text styles</a:t>
             </a:r>
           </a:p>
           <a:p>
             <a:pPr lvl="1"/>
             <a:r>
-              <a:rPr lang="en-US"/>
+              <a:rPr lang="en-US" smtClean="0"/>
               <a:t>Second level</a:t>
             </a:r>
           </a:p>
           <a:p>
             <a:pPr lvl="2"/>
             <a:r>
-              <a:rPr lang="en-US"/>
+              <a:rPr lang="en-US" smtClean="0"/>
               <a:t>Third level</a:t>
             </a:r>
           </a:p>
           <a:p>
             <a:pPr lvl="3"/>
             <a:r>
-              <a:rPr lang="en-US"/>
+              <a:rPr lang="en-US" smtClean="0"/>
               <a:t>Fourth level</a:t>
             </a:r>
           </a:p>
           <a:p>
             <a:pPr lvl="4"/>
             <a:r>
-              <a:rPr lang="en-US"/>
+              <a:rPr lang="en-US" smtClean="0"/>
               <a:t>Fifth level</a:t>
             </a:r>
+            <a:endParaRPr lang="en-US"/>
           </a:p>
         </p:txBody>
       </p:sp>
@@ -718,7 +724,7 @@
           <a:p>
             <a:fld id="{18BDFEC3-8487-43E8-A154-7C12CBC1FFF2}" type="slidenum">
               <a:rPr lang="en-US"/>
-              <a:t>11</a:t>
+              <a:t>12</a:t>
             </a:fld>
             <a:endParaRPr lang="en-US"/>
           </a:p>
@@ -816,7 +822,7 @@
           <a:p>
             <a:fld id="{18BDFEC3-8487-43E8-A154-7C12CBC1FFF2}" type="slidenum">
               <a:rPr lang="en-US"/>
-              <a:t>12</a:t>
+              <a:t>13</a:t>
             </a:fld>
             <a:endParaRPr lang="en-US"/>
           </a:p>
@@ -986,7 +992,7 @@
           <a:p>
             <a:fld id="{18BDFEC3-8487-43E8-A154-7C12CBC1FFF2}" type="slidenum">
               <a:rPr lang="en-US"/>
-              <a:t>13</a:t>
+              <a:t>14</a:t>
             </a:fld>
             <a:endParaRPr lang="en-US"/>
           </a:p>
@@ -1960,7 +1966,7 @@
           <a:p>
             <a:fld id="{18BDFEC3-8487-43E8-A154-7C12CBC1FFF2}" type="slidenum">
               <a:rPr lang="en-US"/>
-              <a:t>14</a:t>
+              <a:t>15</a:t>
             </a:fld>
             <a:endParaRPr lang="en-US"/>
           </a:p>
@@ -5386,7 +5392,7 @@
           <a:p>
             <a:fld id="{18BDFEC3-8487-43E8-A154-7C12CBC1FFF2}" type="slidenum">
               <a:rPr lang="en-US"/>
-              <a:t>15</a:t>
+              <a:t>17</a:t>
             </a:fld>
             <a:endParaRPr lang="en-US"/>
           </a:p>
@@ -7478,7 +7484,7 @@
           <a:p>
             <a:fld id="{18BDFEC3-8487-43E8-A154-7C12CBC1FFF2}" type="slidenum">
               <a:rPr lang="en-US"/>
-              <a:t>16</a:t>
+              <a:t>18</a:t>
             </a:fld>
             <a:endParaRPr lang="en-US"/>
           </a:p>
@@ -11396,7 +11402,7 @@
           <a:p>
             <a:fld id="{18BDFEC3-8487-43E8-A154-7C12CBC1FFF2}" type="slidenum">
               <a:rPr lang="en-US"/>
-              <a:t>17</a:t>
+              <a:t>19</a:t>
             </a:fld>
             <a:endParaRPr lang="en-US"/>
           </a:p>
@@ -14376,7 +14382,7 @@
           <a:p>
             <a:fld id="{18BDFEC3-8487-43E8-A154-7C12CBC1FFF2}" type="slidenum">
               <a:rPr lang="en-US"/>
-              <a:t>18</a:t>
+              <a:t>20</a:t>
             </a:fld>
             <a:endParaRPr lang="en-US"/>
           </a:p>
@@ -15360,7 +15366,7 @@
           <a:p>
             <a:fld id="{18BDFEC3-8487-43E8-A154-7C12CBC1FFF2}" type="slidenum">
               <a:rPr lang="en-US"/>
-              <a:t>19</a:t>
+              <a:t>22</a:t>
             </a:fld>
             <a:endParaRPr lang="en-US"/>
           </a:p>
@@ -17220,7 +17226,7 @@
           <a:p>
             <a:fld id="{18BDFEC3-8487-43E8-A154-7C12CBC1FFF2}" type="slidenum">
               <a:rPr lang="en-US"/>
-              <a:t>20</a:t>
+              <a:t>23</a:t>
             </a:fld>
             <a:endParaRPr lang="en-US"/>
           </a:p>
@@ -21240,7 +21246,7 @@
           <a:p>
             <a:fld id="{18BDFEC3-8487-43E8-A154-7C12CBC1FFF2}" type="slidenum">
               <a:rPr lang="en-US"/>
-              <a:t>21</a:t>
+              <a:t>24</a:t>
             </a:fld>
             <a:endParaRPr lang="en-US"/>
           </a:p>
@@ -22022,7 +22028,7 @@
           <a:p>
             <a:fld id="{18BDFEC3-8487-43E8-A154-7C12CBC1FFF2}" type="slidenum">
               <a:rPr lang="en-US"/>
-              <a:t>22</a:t>
+              <a:t>25</a:t>
             </a:fld>
             <a:endParaRPr lang="en-US"/>
           </a:p>
@@ -24960,7 +24966,7 @@
           <a:p>
             <a:fld id="{18BDFEC3-8487-43E8-A154-7C12CBC1FFF2}" type="slidenum">
               <a:rPr lang="en-US"/>
-              <a:t>23</a:t>
+              <a:t>26</a:t>
             </a:fld>
             <a:endParaRPr lang="en-US"/>
           </a:p>
@@ -30378,7 +30384,7 @@
           <a:p>
             <a:fld id="{18BDFEC3-8487-43E8-A154-7C12CBC1FFF2}" type="slidenum">
               <a:rPr lang="en-US"/>
-              <a:t>24</a:t>
+              <a:t>27</a:t>
             </a:fld>
             <a:endParaRPr lang="en-US"/>
           </a:p>
@@ -37876,7 +37882,7 @@
           <a:p>
             <a:fld id="{18BDFEC3-8487-43E8-A154-7C12CBC1FFF2}" type="slidenum">
               <a:rPr lang="en-US"/>
-              <a:t>25</a:t>
+              <a:t>29</a:t>
             </a:fld>
             <a:endParaRPr lang="en-US"/>
           </a:p>
@@ -43074,7 +43080,7 @@
           <a:p>
             <a:fld id="{18BDFEC3-8487-43E8-A154-7C12CBC1FFF2}" type="slidenum">
               <a:rPr lang="en-US"/>
-              <a:t>26</a:t>
+              <a:t>30</a:t>
             </a:fld>
             <a:endParaRPr lang="en-US"/>
           </a:p>
@@ -44940,7 +44946,7 @@
           <a:p>
             <a:fld id="{18BDFEC3-8487-43E8-A154-7C12CBC1FFF2}" type="slidenum">
               <a:rPr lang="en-US"/>
-              <a:t>27</a:t>
+              <a:t>31</a:t>
             </a:fld>
             <a:endParaRPr lang="en-US"/>
           </a:p>
@@ -53606,7 +53612,7 @@
           <a:p>
             <a:fld id="{18BDFEC3-8487-43E8-A154-7C12CBC1FFF2}" type="slidenum">
               <a:rPr lang="en-US"/>
-              <a:t>7</a:t>
+              <a:t>8</a:t>
             </a:fld>
             <a:endParaRPr lang="en-US"/>
           </a:p>
@@ -54330,7 +54336,7 @@
           <a:p>
             <a:fld id="{18BDFEC3-8487-43E8-A154-7C12CBC1FFF2}" type="slidenum">
               <a:rPr lang="en-US"/>
-              <a:t>8</a:t>
+              <a:t>9</a:t>
             </a:fld>
             <a:endParaRPr lang="en-US"/>
           </a:p>
@@ -54500,7 +54506,7 @@
           <a:p>
             <a:fld id="{18BDFEC3-8487-43E8-A154-7C12CBC1FFF2}" type="slidenum">
               <a:rPr lang="en-US"/>
-              <a:t>9</a:t>
+              <a:t>10</a:t>
             </a:fld>
             <a:endParaRPr lang="en-US"/>
           </a:p>
@@ -54670,7 +54676,7 @@
           <a:p>
             <a:fld id="{18BDFEC3-8487-43E8-A154-7C12CBC1FFF2}" type="slidenum">
               <a:rPr lang="en-US"/>
-              <a:t>10</a:t>
+              <a:t>11</a:t>
             </a:fld>
             <a:endParaRPr lang="en-US"/>
           </a:p>
@@ -54719,9 +54725,10 @@
           <a:lstStyle/>
           <a:p>
             <a:r>
-              <a:rPr lang="en-US"/>
+              <a:rPr lang="en-US" smtClean="0"/>
               <a:t>Click to edit Master title style</a:t>
             </a:r>
+            <a:endParaRPr lang="en-US"/>
           </a:p>
         </p:txBody>
       </p:sp>
@@ -54837,9 +54844,10 @@
           </a:lstStyle>
           <a:p>
             <a:r>
-              <a:rPr lang="en-US"/>
+              <a:rPr lang="en-US" smtClean="0"/>
               <a:t>Click to edit Master subtitle style</a:t>
             </a:r>
+            <a:endParaRPr lang="en-US"/>
           </a:p>
         </p:txBody>
       </p:sp>
@@ -54860,7 +54868,7 @@
           <a:p>
             <a:fld id="{241EB5C9-1307-BA42-ABA2-0BC069CD8E7F}" type="datetimeFigureOut">
               <a:rPr lang="en-US" smtClean="0"/>
-              <a:t>12/30/2018</a:t>
+              <a:t>4/5/2019</a:t>
             </a:fld>
             <a:endParaRPr lang="en-US"/>
           </a:p>
@@ -54954,9 +54962,10 @@
           <a:lstStyle/>
           <a:p>
             <a:r>
-              <a:rPr lang="en-US"/>
+              <a:rPr lang="en-US" smtClean="0"/>
               <a:t>Click to edit Master title style</a:t>
             </a:r>
+            <a:endParaRPr lang="en-US"/>
           </a:p>
         </p:txBody>
       </p:sp>
@@ -54977,37 +54986,38 @@
           <a:p>
             <a:pPr lvl="0"/>
             <a:r>
-              <a:rPr lang="en-US"/>
+              <a:rPr lang="en-US" smtClean="0"/>
               <a:t>Click to edit Master text styles</a:t>
             </a:r>
           </a:p>
           <a:p>
             <a:pPr lvl="1"/>
             <a:r>
-              <a:rPr lang="en-US"/>
+              <a:rPr lang="en-US" smtClean="0"/>
               <a:t>Second level</a:t>
             </a:r>
           </a:p>
           <a:p>
             <a:pPr lvl="2"/>
             <a:r>
-              <a:rPr lang="en-US"/>
+              <a:rPr lang="en-US" smtClean="0"/>
               <a:t>Third level</a:t>
             </a:r>
           </a:p>
           <a:p>
             <a:pPr lvl="3"/>
             <a:r>
-              <a:rPr lang="en-US"/>
+              <a:rPr lang="en-US" smtClean="0"/>
               <a:t>Fourth level</a:t>
             </a:r>
           </a:p>
           <a:p>
             <a:pPr lvl="4"/>
             <a:r>
-              <a:rPr lang="en-US"/>
+              <a:rPr lang="en-US" smtClean="0"/>
               <a:t>Fifth level</a:t>
             </a:r>
+            <a:endParaRPr lang="en-US"/>
           </a:p>
         </p:txBody>
       </p:sp>
@@ -55028,7 +55038,7 @@
           <a:p>
             <a:fld id="{241EB5C9-1307-BA42-ABA2-0BC069CD8E7F}" type="datetimeFigureOut">
               <a:rPr lang="en-US" smtClean="0"/>
-              <a:t>12/30/2018</a:t>
+              <a:t>4/5/2019</a:t>
             </a:fld>
             <a:endParaRPr lang="en-US"/>
           </a:p>
@@ -55127,9 +55137,10 @@
           <a:lstStyle/>
           <a:p>
             <a:r>
-              <a:rPr lang="en-US"/>
+              <a:rPr lang="en-US" smtClean="0"/>
               <a:t>Click to edit Master title style</a:t>
             </a:r>
+            <a:endParaRPr lang="en-US"/>
           </a:p>
         </p:txBody>
       </p:sp>
@@ -55155,37 +55166,38 @@
           <a:p>
             <a:pPr lvl="0"/>
             <a:r>
-              <a:rPr lang="en-US"/>
+              <a:rPr lang="en-US" smtClean="0"/>
               <a:t>Click to edit Master text styles</a:t>
             </a:r>
           </a:p>
           <a:p>
             <a:pPr lvl="1"/>
             <a:r>
-              <a:rPr lang="en-US"/>
+              <a:rPr lang="en-US" smtClean="0"/>
               <a:t>Second level</a:t>
             </a:r>
           </a:p>
           <a:p>
             <a:pPr lvl="2"/>
             <a:r>
-              <a:rPr lang="en-US"/>
+              <a:rPr lang="en-US" smtClean="0"/>
               <a:t>Third level</a:t>
             </a:r>
           </a:p>
           <a:p>
             <a:pPr lvl="3"/>
             <a:r>
-              <a:rPr lang="en-US"/>
+              <a:rPr lang="en-US" smtClean="0"/>
               <a:t>Fourth level</a:t>
             </a:r>
           </a:p>
           <a:p>
             <a:pPr lvl="4"/>
             <a:r>
-              <a:rPr lang="en-US"/>
+              <a:rPr lang="en-US" smtClean="0"/>
               <a:t>Fifth level</a:t>
             </a:r>
+            <a:endParaRPr lang="en-US"/>
           </a:p>
         </p:txBody>
       </p:sp>
@@ -55206,7 +55218,7 @@
           <a:p>
             <a:fld id="{241EB5C9-1307-BA42-ABA2-0BC069CD8E7F}" type="datetimeFigureOut">
               <a:rPr lang="en-US" smtClean="0"/>
-              <a:t>12/30/2018</a:t>
+              <a:t>4/5/2019</a:t>
             </a:fld>
             <a:endParaRPr lang="en-US"/>
           </a:p>
@@ -55300,9 +55312,10 @@
           <a:lstStyle/>
           <a:p>
             <a:r>
-              <a:rPr lang="en-US"/>
+              <a:rPr lang="en-US" smtClean="0"/>
               <a:t>Click to edit Master title style</a:t>
             </a:r>
+            <a:endParaRPr lang="en-US"/>
           </a:p>
         </p:txBody>
       </p:sp>
@@ -55323,37 +55336,38 @@
           <a:p>
             <a:pPr lvl="0"/>
             <a:r>
-              <a:rPr lang="en-US"/>
+              <a:rPr lang="en-US" smtClean="0"/>
               <a:t>Click to edit Master text styles</a:t>
             </a:r>
           </a:p>
           <a:p>
             <a:pPr lvl="1"/>
             <a:r>
-              <a:rPr lang="en-US"/>
+              <a:rPr lang="en-US" smtClean="0"/>
               <a:t>Second level</a:t>
             </a:r>
           </a:p>
           <a:p>
             <a:pPr lvl="2"/>
             <a:r>
-              <a:rPr lang="en-US"/>
+              <a:rPr lang="en-US" smtClean="0"/>
               <a:t>Third level</a:t>
             </a:r>
           </a:p>
           <a:p>
             <a:pPr lvl="3"/>
             <a:r>
-              <a:rPr lang="en-US"/>
+              <a:rPr lang="en-US" smtClean="0"/>
               <a:t>Fourth level</a:t>
             </a:r>
           </a:p>
           <a:p>
             <a:pPr lvl="4"/>
             <a:r>
-              <a:rPr lang="en-US"/>
+              <a:rPr lang="en-US" smtClean="0"/>
               <a:t>Fifth level</a:t>
             </a:r>
+            <a:endParaRPr lang="en-US"/>
           </a:p>
         </p:txBody>
       </p:sp>
@@ -55374,7 +55388,7 @@
           <a:p>
             <a:fld id="{241EB5C9-1307-BA42-ABA2-0BC069CD8E7F}" type="datetimeFigureOut">
               <a:rPr lang="en-US" smtClean="0"/>
-              <a:t>12/30/2018</a:t>
+              <a:t>4/5/2019</a:t>
             </a:fld>
             <a:endParaRPr lang="en-US"/>
           </a:p>
@@ -55477,9 +55491,10 @@
           </a:lstStyle>
           <a:p>
             <a:r>
-              <a:rPr lang="en-US"/>
+              <a:rPr lang="en-US" smtClean="0"/>
               <a:t>Click to edit Master title style</a:t>
             </a:r>
+            <a:endParaRPr lang="en-US"/>
           </a:p>
         </p:txBody>
       </p:sp>
@@ -55596,7 +55611,7 @@
           <a:p>
             <a:pPr lvl="0"/>
             <a:r>
-              <a:rPr lang="en-US"/>
+              <a:rPr lang="en-US" smtClean="0"/>
               <a:t>Click to edit Master text styles</a:t>
             </a:r>
           </a:p>
@@ -55619,7 +55634,7 @@
           <a:p>
             <a:fld id="{241EB5C9-1307-BA42-ABA2-0BC069CD8E7F}" type="datetimeFigureOut">
               <a:rPr lang="en-US" smtClean="0"/>
-              <a:t>12/30/2018</a:t>
+              <a:t>4/5/2019</a:t>
             </a:fld>
             <a:endParaRPr lang="en-US"/>
           </a:p>
@@ -55713,9 +55728,10 @@
           <a:lstStyle/>
           <a:p>
             <a:r>
-              <a:rPr lang="en-US"/>
+              <a:rPr lang="en-US" smtClean="0"/>
               <a:t>Click to edit Master title style</a:t>
             </a:r>
+            <a:endParaRPr lang="en-US"/>
           </a:p>
         </p:txBody>
       </p:sp>
@@ -55769,37 +55785,38 @@
           <a:p>
             <a:pPr lvl="0"/>
             <a:r>
-              <a:rPr lang="en-US"/>
+              <a:rPr lang="en-US" smtClean="0"/>
               <a:t>Click to edit Master text styles</a:t>
             </a:r>
           </a:p>
           <a:p>
             <a:pPr lvl="1"/>
             <a:r>
-              <a:rPr lang="en-US"/>
+              <a:rPr lang="en-US" smtClean="0"/>
               <a:t>Second level</a:t>
             </a:r>
           </a:p>
           <a:p>
             <a:pPr lvl="2"/>
             <a:r>
-              <a:rPr lang="en-US"/>
+              <a:rPr lang="en-US" smtClean="0"/>
               <a:t>Third level</a:t>
             </a:r>
           </a:p>
           <a:p>
             <a:pPr lvl="3"/>
             <a:r>
-              <a:rPr lang="en-US"/>
+              <a:rPr lang="en-US" smtClean="0"/>
               <a:t>Fourth level</a:t>
             </a:r>
           </a:p>
           <a:p>
             <a:pPr lvl="4"/>
             <a:r>
-              <a:rPr lang="en-US"/>
+              <a:rPr lang="en-US" smtClean="0"/>
               <a:t>Fifth level</a:t>
             </a:r>
+            <a:endParaRPr lang="en-US"/>
           </a:p>
         </p:txBody>
       </p:sp>
@@ -55853,37 +55870,38 @@
           <a:p>
             <a:pPr lvl="0"/>
             <a:r>
-              <a:rPr lang="en-US"/>
+              <a:rPr lang="en-US" smtClean="0"/>
               <a:t>Click to edit Master text styles</a:t>
             </a:r>
           </a:p>
           <a:p>
             <a:pPr lvl="1"/>
             <a:r>
-              <a:rPr lang="en-US"/>
+              <a:rPr lang="en-US" smtClean="0"/>
               <a:t>Second level</a:t>
             </a:r>
           </a:p>
           <a:p>
             <a:pPr lvl="2"/>
             <a:r>
-              <a:rPr lang="en-US"/>
+              <a:rPr lang="en-US" smtClean="0"/>
               <a:t>Third level</a:t>
             </a:r>
           </a:p>
           <a:p>
             <a:pPr lvl="3"/>
             <a:r>
-              <a:rPr lang="en-US"/>
+              <a:rPr lang="en-US" smtClean="0"/>
               <a:t>Fourth level</a:t>
             </a:r>
           </a:p>
           <a:p>
             <a:pPr lvl="4"/>
             <a:r>
-              <a:rPr lang="en-US"/>
+              <a:rPr lang="en-US" smtClean="0"/>
               <a:t>Fifth level</a:t>
             </a:r>
+            <a:endParaRPr lang="en-US"/>
           </a:p>
         </p:txBody>
       </p:sp>
@@ -55904,7 +55922,7 @@
           <a:p>
             <a:fld id="{241EB5C9-1307-BA42-ABA2-0BC069CD8E7F}" type="datetimeFigureOut">
               <a:rPr lang="en-US" smtClean="0"/>
-              <a:t>12/30/2018</a:t>
+              <a:t>4/5/2019</a:t>
             </a:fld>
             <a:endParaRPr lang="en-US"/>
           </a:p>
@@ -56002,9 +56020,10 @@
           </a:lstStyle>
           <a:p>
             <a:r>
-              <a:rPr lang="en-US"/>
+              <a:rPr lang="en-US" smtClean="0"/>
               <a:t>Click to edit Master title style</a:t>
             </a:r>
+            <a:endParaRPr lang="en-US"/>
           </a:p>
         </p:txBody>
       </p:sp>
@@ -56067,7 +56086,7 @@
           <a:p>
             <a:pPr lvl="0"/>
             <a:r>
-              <a:rPr lang="en-US"/>
+              <a:rPr lang="en-US" smtClean="0"/>
               <a:t>Click to edit Master text styles</a:t>
             </a:r>
           </a:p>
@@ -56123,37 +56142,38 @@
           <a:p>
             <a:pPr lvl="0"/>
             <a:r>
-              <a:rPr lang="en-US"/>
+              <a:rPr lang="en-US" smtClean="0"/>
               <a:t>Click to edit Master text styles</a:t>
             </a:r>
           </a:p>
           <a:p>
             <a:pPr lvl="1"/>
             <a:r>
-              <a:rPr lang="en-US"/>
+              <a:rPr lang="en-US" smtClean="0"/>
               <a:t>Second level</a:t>
             </a:r>
           </a:p>
           <a:p>
             <a:pPr lvl="2"/>
             <a:r>
-              <a:rPr lang="en-US"/>
+              <a:rPr lang="en-US" smtClean="0"/>
               <a:t>Third level</a:t>
             </a:r>
           </a:p>
           <a:p>
             <a:pPr lvl="3"/>
             <a:r>
-              <a:rPr lang="en-US"/>
+              <a:rPr lang="en-US" smtClean="0"/>
               <a:t>Fourth level</a:t>
             </a:r>
           </a:p>
           <a:p>
             <a:pPr lvl="4"/>
             <a:r>
-              <a:rPr lang="en-US"/>
+              <a:rPr lang="en-US" smtClean="0"/>
               <a:t>Fifth level</a:t>
             </a:r>
+            <a:endParaRPr lang="en-US"/>
           </a:p>
         </p:txBody>
       </p:sp>
@@ -56216,7 +56236,7 @@
           <a:p>
             <a:pPr lvl="0"/>
             <a:r>
-              <a:rPr lang="en-US"/>
+              <a:rPr lang="en-US" smtClean="0"/>
               <a:t>Click to edit Master text styles</a:t>
             </a:r>
           </a:p>
@@ -56272,37 +56292,38 @@
           <a:p>
             <a:pPr lvl="0"/>
             <a:r>
-              <a:rPr lang="en-US"/>
+              <a:rPr lang="en-US" smtClean="0"/>
               <a:t>Click to edit Master text styles</a:t>
             </a:r>
           </a:p>
           <a:p>
             <a:pPr lvl="1"/>
             <a:r>
-              <a:rPr lang="en-US"/>
+              <a:rPr lang="en-US" smtClean="0"/>
               <a:t>Second level</a:t>
             </a:r>
           </a:p>
           <a:p>
             <a:pPr lvl="2"/>
             <a:r>
-              <a:rPr lang="en-US"/>
+              <a:rPr lang="en-US" smtClean="0"/>
               <a:t>Third level</a:t>
             </a:r>
           </a:p>
           <a:p>
             <a:pPr lvl="3"/>
             <a:r>
-              <a:rPr lang="en-US"/>
+              <a:rPr lang="en-US" smtClean="0"/>
               <a:t>Fourth level</a:t>
             </a:r>
           </a:p>
           <a:p>
             <a:pPr lvl="4"/>
             <a:r>
-              <a:rPr lang="en-US"/>
+              <a:rPr lang="en-US" smtClean="0"/>
               <a:t>Fifth level</a:t>
             </a:r>
+            <a:endParaRPr lang="en-US"/>
           </a:p>
         </p:txBody>
       </p:sp>
@@ -56323,7 +56344,7 @@
           <a:p>
             <a:fld id="{241EB5C9-1307-BA42-ABA2-0BC069CD8E7F}" type="datetimeFigureOut">
               <a:rPr lang="en-US" smtClean="0"/>
-              <a:t>12/30/2018</a:t>
+              <a:t>4/5/2019</a:t>
             </a:fld>
             <a:endParaRPr lang="en-US"/>
           </a:p>
@@ -56417,9 +56438,10 @@
           <a:lstStyle/>
           <a:p>
             <a:r>
-              <a:rPr lang="en-US"/>
+              <a:rPr lang="en-US" smtClean="0"/>
               <a:t>Click to edit Master title style</a:t>
             </a:r>
+            <a:endParaRPr lang="en-US"/>
           </a:p>
         </p:txBody>
       </p:sp>
@@ -56440,7 +56462,7 @@
           <a:p>
             <a:fld id="{241EB5C9-1307-BA42-ABA2-0BC069CD8E7F}" type="datetimeFigureOut">
               <a:rPr lang="en-US" smtClean="0"/>
-              <a:t>12/30/2018</a:t>
+              <a:t>4/5/2019</a:t>
             </a:fld>
             <a:endParaRPr lang="en-US"/>
           </a:p>
@@ -56535,7 +56557,7 @@
           <a:p>
             <a:fld id="{241EB5C9-1307-BA42-ABA2-0BC069CD8E7F}" type="datetimeFigureOut">
               <a:rPr lang="en-US" smtClean="0"/>
-              <a:t>12/30/2018</a:t>
+              <a:t>4/5/2019</a:t>
             </a:fld>
             <a:endParaRPr lang="en-US"/>
           </a:p>
@@ -56638,9 +56660,10 @@
           </a:lstStyle>
           <a:p>
             <a:r>
-              <a:rPr lang="en-US"/>
+              <a:rPr lang="en-US" smtClean="0"/>
               <a:t>Click to edit Master title style</a:t>
             </a:r>
+            <a:endParaRPr lang="en-US"/>
           </a:p>
         </p:txBody>
       </p:sp>
@@ -56694,37 +56717,38 @@
           <a:p>
             <a:pPr lvl="0"/>
             <a:r>
-              <a:rPr lang="en-US"/>
+              <a:rPr lang="en-US" smtClean="0"/>
               <a:t>Click to edit Master text styles</a:t>
             </a:r>
           </a:p>
           <a:p>
             <a:pPr lvl="1"/>
             <a:r>
-              <a:rPr lang="en-US"/>
+              <a:rPr lang="en-US" smtClean="0"/>
               <a:t>Second level</a:t>
             </a:r>
           </a:p>
           <a:p>
             <a:pPr lvl="2"/>
             <a:r>
-              <a:rPr lang="en-US"/>
+              <a:rPr lang="en-US" smtClean="0"/>
               <a:t>Third level</a:t>
             </a:r>
           </a:p>
           <a:p>
             <a:pPr lvl="3"/>
             <a:r>
-              <a:rPr lang="en-US"/>
+              <a:rPr lang="en-US" smtClean="0"/>
               <a:t>Fourth level</a:t>
             </a:r>
           </a:p>
           <a:p>
             <a:pPr lvl="4"/>
             <a:r>
-              <a:rPr lang="en-US"/>
+              <a:rPr lang="en-US" smtClean="0"/>
               <a:t>Fifth level</a:t>
             </a:r>
+            <a:endParaRPr lang="en-US"/>
           </a:p>
         </p:txBody>
       </p:sp>
@@ -56787,7 +56811,7 @@
           <a:p>
             <a:pPr lvl="0"/>
             <a:r>
-              <a:rPr lang="en-US"/>
+              <a:rPr lang="en-US" smtClean="0"/>
               <a:t>Click to edit Master text styles</a:t>
             </a:r>
           </a:p>
@@ -56810,7 +56834,7 @@
           <a:p>
             <a:fld id="{241EB5C9-1307-BA42-ABA2-0BC069CD8E7F}" type="datetimeFigureOut">
               <a:rPr lang="en-US" smtClean="0"/>
-              <a:t>12/30/2018</a:t>
+              <a:t>4/5/2019</a:t>
             </a:fld>
             <a:endParaRPr lang="en-US"/>
           </a:p>
@@ -56913,9 +56937,10 @@
           </a:lstStyle>
           <a:p>
             <a:r>
-              <a:rPr lang="en-US"/>
+              <a:rPr lang="en-US" smtClean="0"/>
               <a:t>Click to edit Master title style</a:t>
             </a:r>
+            <a:endParaRPr lang="en-US"/>
           </a:p>
         </p:txBody>
       </p:sp>
@@ -57039,7 +57064,7 @@
           <a:p>
             <a:pPr lvl="0"/>
             <a:r>
-              <a:rPr lang="en-US"/>
+              <a:rPr lang="en-US" smtClean="0"/>
               <a:t>Click to edit Master text styles</a:t>
             </a:r>
           </a:p>
@@ -57062,7 +57087,7 @@
           <a:p>
             <a:fld id="{241EB5C9-1307-BA42-ABA2-0BC069CD8E7F}" type="datetimeFigureOut">
               <a:rPr lang="en-US" smtClean="0"/>
-              <a:t>12/30/2018</a:t>
+              <a:t>4/5/2019</a:t>
             </a:fld>
             <a:endParaRPr lang="en-US"/>
           </a:p>
@@ -57171,9 +57196,10 @@
           <a:lstStyle/>
           <a:p>
             <a:r>
-              <a:rPr lang="en-US"/>
+              <a:rPr lang="en-US" smtClean="0"/>
               <a:t>Click to edit Master title style</a:t>
             </a:r>
+            <a:endParaRPr lang="en-US"/>
           </a:p>
         </p:txBody>
       </p:sp>
@@ -57204,37 +57230,38 @@
           <a:p>
             <a:pPr lvl="0"/>
             <a:r>
-              <a:rPr lang="en-US"/>
+              <a:rPr lang="en-US" smtClean="0"/>
               <a:t>Click to edit Master text styles</a:t>
             </a:r>
           </a:p>
           <a:p>
             <a:pPr lvl="1"/>
             <a:r>
-              <a:rPr lang="en-US"/>
+              <a:rPr lang="en-US" smtClean="0"/>
               <a:t>Second level</a:t>
             </a:r>
           </a:p>
           <a:p>
             <a:pPr lvl="2"/>
             <a:r>
-              <a:rPr lang="en-US"/>
+              <a:rPr lang="en-US" smtClean="0"/>
               <a:t>Third level</a:t>
             </a:r>
           </a:p>
           <a:p>
             <a:pPr lvl="3"/>
             <a:r>
-              <a:rPr lang="en-US"/>
+              <a:rPr lang="en-US" smtClean="0"/>
               <a:t>Fourth level</a:t>
             </a:r>
           </a:p>
           <a:p>
             <a:pPr lvl="4"/>
             <a:r>
-              <a:rPr lang="en-US"/>
+              <a:rPr lang="en-US" smtClean="0"/>
               <a:t>Fifth level</a:t>
             </a:r>
+            <a:endParaRPr lang="en-US"/>
           </a:p>
         </p:txBody>
       </p:sp>
@@ -57273,7 +57300,7 @@
           <a:p>
             <a:fld id="{241EB5C9-1307-BA42-ABA2-0BC069CD8E7F}" type="datetimeFigureOut">
               <a:rPr lang="en-US" smtClean="0"/>
-              <a:t>12/30/2018</a:t>
+              <a:t>4/5/2019</a:t>
             </a:fld>
             <a:endParaRPr lang="en-US"/>
           </a:p>
@@ -57848,6 +57875,241 @@
             </a:r>
             <a:r>
               <a:rPr/>
+              <a:t>2</a:t>
+            </a:r>
+            <a:r>
+              <a:rPr/>
+              <a:t> </a:t>
+            </a:r>
+            <a:r>
+              <a:rPr/>
+              <a:t>of</a:t>
+            </a:r>
+            <a:r>
+              <a:rPr/>
+              <a:t> </a:t>
+            </a:r>
+            <a:r>
+              <a:rPr/>
+              <a:t>7)</a:t>
+            </a:r>
+          </a:p>
+        </p:txBody>
+      </p:sp>
+      <p:pic>
+        <p:nvPicPr>
+          <p:cNvPr descr="../images/04/fishy02.png" id="0" name="Picture 1"/>
+          <p:cNvPicPr>
+            <a:picLocks noGrp="1" noChangeAspect="1"/>
+          </p:cNvPicPr>
+          <p:nvPr/>
+        </p:nvPicPr>
+        <p:blipFill>
+          <a:blip r:embed="rId3"/>
+          <a:stretch>
+            <a:fillRect/>
+          </a:stretch>
+        </p:blipFill>
+        <p:spPr bwMode="auto">
+          <a:xfrm>
+            <a:off x="1892300" y="1600200"/>
+            <a:ext cx="5346700" cy="4013200"/>
+          </a:xfrm>
+          <a:prstGeom prst="rect">
+            <a:avLst/>
+          </a:prstGeom>
+          <a:noFill/>
+          <a:ln w="9525">
+            <a:noFill/>
+            <a:headEnd/>
+            <a:tailEnd/>
+          </a:ln>
+        </p:spPr>
+      </p:pic>
+      <p:sp>
+        <p:nvSpPr>
+          <p:cNvPr id="1" name="TextBox 3"/>
+          <p:cNvSpPr txBox="1"/>
+          <p:nvPr/>
+        </p:nvSpPr>
+        <p:spPr>
+          <a:xfrm>
+            <a:off x="457200" y="5613400"/>
+            <a:ext cx="8229600" cy="508000"/>
+          </a:xfrm>
+          <a:prstGeom prst="rect">
+            <a:avLst/>
+          </a:prstGeom>
+          <a:noFill/>
+        </p:spPr>
+        <p:txBody>
+          <a:bodyPr/>
+          <a:lstStyle/>
+          <a:p>
+            <a:pPr lvl="0" marL="0" indent="0" algn="ctr">
+              <a:buNone/>
+            </a:pPr>
+            <a:r>
+              <a:rPr/>
+              <a:t>Figure</a:t>
+            </a:r>
+            <a:r>
+              <a:rPr/>
+              <a:t> </a:t>
+            </a:r>
+            <a:r>
+              <a:rPr/>
+              <a:t>2.</a:t>
+            </a:r>
+            <a:r>
+              <a:rPr/>
+              <a:t> </a:t>
+            </a:r>
+            <a:r>
+              <a:rPr/>
+              <a:t>First</a:t>
+            </a:r>
+            <a:r>
+              <a:rPr/>
+              <a:t> </a:t>
+            </a:r>
+            <a:r>
+              <a:rPr/>
+              <a:t>six</a:t>
+            </a:r>
+            <a:r>
+              <a:rPr/>
+              <a:t> </a:t>
+            </a:r>
+            <a:r>
+              <a:rPr/>
+              <a:t>fish</a:t>
+            </a:r>
+            <a:r>
+              <a:rPr/>
+              <a:t> </a:t>
+            </a:r>
+            <a:r>
+              <a:rPr/>
+              <a:t>go</a:t>
+            </a:r>
+            <a:r>
+              <a:rPr/>
+              <a:t> </a:t>
+            </a:r>
+            <a:r>
+              <a:rPr/>
+              <a:t>in</a:t>
+            </a:r>
+            <a:r>
+              <a:rPr/>
+              <a:t> </a:t>
+            </a:r>
+            <a:r>
+              <a:rPr/>
+              <a:t>the</a:t>
+            </a:r>
+            <a:r>
+              <a:rPr/>
+              <a:t> </a:t>
+            </a:r>
+            <a:r>
+              <a:rPr/>
+              <a:t>first</a:t>
+            </a:r>
+            <a:r>
+              <a:rPr/>
+              <a:t> </a:t>
+            </a:r>
+            <a:r>
+              <a:rPr/>
+              <a:t>tank</a:t>
+            </a:r>
+          </a:p>
+        </p:txBody>
+      </p:sp>
+    </p:spTree>
+  </p:cSld>
+</p:sld>
+</file>
+
+<file path=ppt/slides/slide11.xml><?xml version="1.0" encoding="utf-8"?>
+<p:sld xmlns:a="http://schemas.openxmlformats.org/drawingml/2006/main" xmlns:r="http://schemas.openxmlformats.org/officeDocument/2006/relationships" xmlns:p="http://schemas.openxmlformats.org/presentationml/2006/main">
+  <p:cSld>
+    <p:spTree>
+      <p:nvGrpSpPr>
+        <p:cNvPr id="1" name=""/>
+        <p:cNvGrpSpPr/>
+        <p:nvPr/>
+      </p:nvGrpSpPr>
+      <p:grpSpPr>
+        <a:xfrm>
+          <a:off x="0" y="0"/>
+          <a:ext cx="0" cy="0"/>
+          <a:chOff x="0" y="0"/>
+          <a:chExt cx="0" cy="0"/>
+        </a:xfrm>
+      </p:grpSpPr>
+      <p:sp>
+        <p:nvSpPr>
+          <p:cNvPr id="2" name="Title 1"/>
+          <p:cNvSpPr>
+            <a:spLocks noGrp="1"/>
+          </p:cNvSpPr>
+          <p:nvPr>
+            <p:ph type="title"/>
+          </p:nvPr>
+        </p:nvSpPr>
+        <p:spPr/>
+        <p:txBody>
+          <a:bodyPr/>
+          <a:lstStyle/>
+          <a:p>
+            <a:pPr lvl="0" marL="0" indent="0">
+              <a:buNone/>
+            </a:pPr>
+            <a:r>
+              <a:rPr/>
+              <a:t>A</a:t>
+            </a:r>
+            <a:r>
+              <a:rPr/>
+              <a:t> </a:t>
+            </a:r>
+            <a:r>
+              <a:rPr/>
+              <a:t>fishy</a:t>
+            </a:r>
+            <a:r>
+              <a:rPr/>
+              <a:t> </a:t>
+            </a:r>
+            <a:r>
+              <a:rPr/>
+              <a:t>research</a:t>
+            </a:r>
+            <a:r>
+              <a:rPr/>
+              <a:t> </a:t>
+            </a:r>
+            <a:r>
+              <a:rPr/>
+              <a:t>story</a:t>
+            </a:r>
+            <a:r>
+              <a:rPr/>
+              <a:t> </a:t>
+            </a:r>
+            <a:r>
+              <a:rPr/>
+              <a:t>(part</a:t>
+            </a:r>
+            <a:r>
+              <a:rPr/>
+              <a:t> </a:t>
+            </a:r>
+            <a:r>
+              <a:rPr/>
               <a:t>3</a:t>
             </a:r>
             <a:r>
@@ -58006,7 +58268,7 @@
 </p:sld>
 </file>
 
-<file path=ppt/slides/slide11.xml><?xml version="1.0" encoding="utf-8"?>
+<file path=ppt/slides/slide12.xml><?xml version="1.0" encoding="utf-8"?>
 <p:sld xmlns:a="http://schemas.openxmlformats.org/drawingml/2006/main" xmlns:r="http://schemas.openxmlformats.org/officeDocument/2006/relationships" xmlns:p="http://schemas.openxmlformats.org/presentationml/2006/main">
   <p:cSld>
     <p:spTree>
@@ -58241,7 +58503,7 @@
 </p:sld>
 </file>
 
-<file path=ppt/slides/slide12.xml><?xml version="1.0" encoding="utf-8"?>
+<file path=ppt/slides/slide13.xml><?xml version="1.0" encoding="utf-8"?>
 <p:sld xmlns:a="http://schemas.openxmlformats.org/drawingml/2006/main" xmlns:r="http://schemas.openxmlformats.org/officeDocument/2006/relationships" xmlns:p="http://schemas.openxmlformats.org/presentationml/2006/main">
   <p:cSld>
     <p:spTree>
@@ -58476,7 +58738,7 @@
 </p:sld>
 </file>
 
-<file path=ppt/slides/slide13.xml><?xml version="1.0" encoding="utf-8"?>
+<file path=ppt/slides/slide14.xml><?xml version="1.0" encoding="utf-8"?>
 <p:sld xmlns:a="http://schemas.openxmlformats.org/drawingml/2006/main" xmlns:r="http://schemas.openxmlformats.org/officeDocument/2006/relationships" xmlns:p="http://schemas.openxmlformats.org/presentationml/2006/main">
   <p:cSld>
     <p:spTree>
@@ -58711,7 +58973,7 @@
 </p:sld>
 </file>
 
-<file path=ppt/slides/slide14.xml><?xml version="1.0" encoding="utf-8"?>
+<file path=ppt/slides/slide15.xml><?xml version="1.0" encoding="utf-8"?>
 <p:sld xmlns:a="http://schemas.openxmlformats.org/drawingml/2006/main" xmlns:r="http://schemas.openxmlformats.org/officeDocument/2006/relationships" xmlns:p="http://schemas.openxmlformats.org/presentationml/2006/main">
   <p:cSld>
     <p:spTree>
@@ -58930,141 +59192,6 @@
 </p:sld>
 </file>
 
-<file path=ppt/slides/slide15.xml><?xml version="1.0" encoding="utf-8"?>
-<p:sld xmlns:a="http://schemas.openxmlformats.org/drawingml/2006/main" xmlns:r="http://schemas.openxmlformats.org/officeDocument/2006/relationships" xmlns:p="http://schemas.openxmlformats.org/presentationml/2006/main">
-  <p:cSld>
-    <p:spTree>
-      <p:nvGrpSpPr>
-        <p:cNvPr id="1" name=""/>
-        <p:cNvGrpSpPr/>
-        <p:nvPr/>
-      </p:nvGrpSpPr>
-      <p:grpSpPr>
-        <a:xfrm>
-          <a:off x="0" y="0"/>
-          <a:ext cx="0" cy="0"/>
-          <a:chOff x="0" y="0"/>
-          <a:chExt cx="0" cy="0"/>
-        </a:xfrm>
-      </p:grpSpPr>
-      <p:sp>
-        <p:nvSpPr>
-          <p:cNvPr id="2" name="Title 1"/>
-          <p:cNvSpPr>
-            <a:spLocks noGrp="1"/>
-          </p:cNvSpPr>
-          <p:nvPr>
-            <p:ph type="title"/>
-          </p:nvPr>
-        </p:nvSpPr>
-        <p:spPr/>
-        <p:txBody>
-          <a:bodyPr/>
-          <a:lstStyle/>
-          <a:p>
-            <a:pPr lvl="0" marL="0" indent="0">
-              <a:buNone/>
-            </a:pPr>
-            <a:r>
-              <a:rPr/>
-              <a:t>Advantages</a:t>
-            </a:r>
-            <a:r>
-              <a:rPr/>
-              <a:t> </a:t>
-            </a:r>
-            <a:r>
-              <a:rPr/>
-              <a:t>of</a:t>
-            </a:r>
-            <a:r>
-              <a:rPr/>
-              <a:t> </a:t>
-            </a:r>
-            <a:r>
-              <a:rPr/>
-              <a:t>randomization</a:t>
-            </a:r>
-          </a:p>
-        </p:txBody>
-      </p:sp>
-      <p:sp>
-        <p:nvSpPr>
-          <p:cNvPr id="3" name="Content Placeholder 2"/>
-          <p:cNvSpPr>
-            <a:spLocks noGrp="1"/>
-          </p:cNvSpPr>
-          <p:nvPr>
-            <p:ph idx="1"/>
-          </p:nvPr>
-        </p:nvSpPr>
-        <p:spPr/>
-        <p:txBody>
-          <a:bodyPr/>
-          <a:lstStyle/>
-          <a:p>
-            <a:pPr lvl="1"/>
-            <a:r>
-              <a:rPr/>
-              <a:t>Insures covariate balance</a:t>
-            </a:r>
-          </a:p>
-          <a:p>
-            <a:pPr lvl="2"/>
-            <a:r>
-              <a:rPr/>
-              <a:t>Smoking during pregnancy and Down’s syndrome</a:t>
-            </a:r>
-          </a:p>
-          <a:p>
-            <a:pPr lvl="1"/>
-            <a:r>
-              <a:rPr/>
-              <a:t>Difficult or impossible to measure covariates</a:t>
-            </a:r>
-          </a:p>
-          <a:p>
-            <a:pPr lvl="2"/>
-            <a:r>
-              <a:rPr/>
-              <a:t>Severity of illness</a:t>
-            </a:r>
-          </a:p>
-          <a:p>
-            <a:pPr lvl="2"/>
-            <a:r>
-              <a:rPr/>
-              <a:t>Co-medications</a:t>
-            </a:r>
-          </a:p>
-          <a:p>
-            <a:pPr lvl="2"/>
-            <a:r>
-              <a:rPr/>
-              <a:t>Co-morbidities</a:t>
-            </a:r>
-          </a:p>
-          <a:p>
-            <a:pPr lvl="2"/>
-            <a:r>
-              <a:rPr/>
-              <a:t>Patient’s psychological state</a:t>
-            </a:r>
-          </a:p>
-          <a:p>
-            <a:pPr lvl="1"/>
-            <a:r>
-              <a:rPr/>
-              <a:t>Avoids selection bias</a:t>
-            </a:r>
-          </a:p>
-        </p:txBody>
-      </p:sp>
-    </p:spTree>
-  </p:cSld>
-</p:sld>
-</file>
-
 <file path=ppt/slides/slide16.xml><?xml version="1.0" encoding="utf-8"?>
 <p:sld xmlns:a="http://schemas.openxmlformats.org/drawingml/2006/main" xmlns:r="http://schemas.openxmlformats.org/officeDocument/2006/relationships" xmlns:p="http://schemas.openxmlformats.org/presentationml/2006/main">
   <p:cSld>
@@ -59102,23 +59229,15 @@
             </a:pPr>
             <a:r>
               <a:rPr/>
-              <a:t>Disadvantages</a:t>
-            </a:r>
-            <a:r>
-              <a:rPr/>
-              <a:t> </a:t>
-            </a:r>
-            <a:r>
-              <a:rPr/>
-              <a:t>of</a:t>
-            </a:r>
-            <a:r>
-              <a:rPr/>
-              <a:t> </a:t>
-            </a:r>
-            <a:r>
-              <a:rPr/>
-              <a:t>randomization</a:t>
+              <a:t>Break</a:t>
+            </a:r>
+            <a:r>
+              <a:rPr/>
+              <a:t> </a:t>
+            </a:r>
+            <a:r>
+              <a:rPr/>
+              <a:t>#2</a:t>
             </a:r>
           </a:p>
         </p:txBody>
@@ -59141,28 +59260,42 @@
             <a:pPr lvl="1"/>
             <a:r>
               <a:rPr/>
-              <a:t>Expensive</a:t>
+              <a:t>What have you learned</a:t>
+            </a:r>
+          </a:p>
+          <a:p>
+            <a:pPr lvl="2"/>
+            <a:r>
+              <a:rPr/>
+              <a:t>How to randomize</a:t>
+            </a:r>
+          </a:p>
+          <a:p>
+            <a:pPr lvl="2"/>
+            <a:r>
+              <a:rPr/>
+              <a:t>Fishy example of randomization</a:t>
             </a:r>
           </a:p>
           <a:p>
             <a:pPr lvl="1"/>
             <a:r>
               <a:rPr/>
-              <a:t>Artificial</a:t>
+              <a:t>What’s next</a:t>
             </a:r>
           </a:p>
           <a:p>
             <a:pPr lvl="2"/>
             <a:r>
               <a:rPr/>
-              <a:t>Extra tests, extra attention</a:t>
+              <a:t>Advantages and disadvantages of randomization</a:t>
             </a:r>
           </a:p>
           <a:p>
             <a:pPr lvl="2"/>
             <a:r>
               <a:rPr/>
-              <a:t>Explicit acknowledgement of uncertainty</a:t>
+              <a:t>Alternatives to randomization</a:t>
             </a:r>
           </a:p>
         </p:txBody>
@@ -59209,31 +59342,23 @@
             </a:pPr>
             <a:r>
               <a:rPr/>
-              <a:t>When</a:t>
-            </a:r>
-            <a:r>
-              <a:rPr/>
-              <a:t> </a:t>
-            </a:r>
-            <a:r>
-              <a:rPr/>
-              <a:t>can’t</a:t>
-            </a:r>
-            <a:r>
-              <a:rPr/>
-              <a:t> </a:t>
-            </a:r>
-            <a:r>
-              <a:rPr/>
-              <a:t>you</a:t>
-            </a:r>
-            <a:r>
-              <a:rPr/>
-              <a:t> </a:t>
-            </a:r>
-            <a:r>
-              <a:rPr/>
-              <a:t>randomize</a:t>
+              <a:t>Advantages</a:t>
+            </a:r>
+            <a:r>
+              <a:rPr/>
+              <a:t> </a:t>
+            </a:r>
+            <a:r>
+              <a:rPr/>
+              <a:t>of</a:t>
+            </a:r>
+            <a:r>
+              <a:rPr/>
+              <a:t> </a:t>
+            </a:r>
+            <a:r>
+              <a:rPr/>
+              <a:t>randomization</a:t>
             </a:r>
           </a:p>
         </p:txBody>
@@ -59256,70 +59381,56 @@
             <a:pPr lvl="1"/>
             <a:r>
               <a:rPr/>
-              <a:t>Unethical</a:t>
+              <a:t>Insures covariate balance</a:t>
             </a:r>
           </a:p>
           <a:p>
             <a:pPr lvl="2"/>
             <a:r>
               <a:rPr/>
-              <a:t>Lack of equipoise</a:t>
+              <a:t>Smoking during pregnancy and Down’s syndrome</a:t>
+            </a:r>
+          </a:p>
+          <a:p>
+            <a:pPr lvl="1"/>
+            <a:r>
+              <a:rPr/>
+              <a:t>Difficult or impossible to measure covariates</a:t>
             </a:r>
           </a:p>
           <a:p>
             <a:pPr lvl="2"/>
             <a:r>
               <a:rPr/>
-              <a:t>Harmful exposures</a:t>
+              <a:t>Severity of illness</a:t>
+            </a:r>
+          </a:p>
+          <a:p>
+            <a:pPr lvl="2"/>
+            <a:r>
+              <a:rPr/>
+              <a:t>Co-medications</a:t>
+            </a:r>
+          </a:p>
+          <a:p>
+            <a:pPr lvl="2"/>
+            <a:r>
+              <a:rPr/>
+              <a:t>Co-morbidities</a:t>
+            </a:r>
+          </a:p>
+          <a:p>
+            <a:pPr lvl="2"/>
+            <a:r>
+              <a:rPr/>
+              <a:t>Patient’s psychological state</a:t>
             </a:r>
           </a:p>
           <a:p>
             <a:pPr lvl="1"/>
             <a:r>
               <a:rPr/>
-              <a:t>Impractical</a:t>
-            </a:r>
-          </a:p>
-          <a:p>
-            <a:pPr lvl="2"/>
-            <a:r>
-              <a:rPr/>
-              <a:t>Too many patients</a:t>
-            </a:r>
-          </a:p>
-          <a:p>
-            <a:pPr lvl="2"/>
-            <a:r>
-              <a:rPr/>
-              <a:t>Too much time</a:t>
-            </a:r>
-          </a:p>
-          <a:p>
-            <a:pPr lvl="2"/>
-            <a:r>
-              <a:rPr/>
-              <a:t>Strong patient preferences</a:t>
-            </a:r>
-          </a:p>
-          <a:p>
-            <a:pPr lvl="1"/>
-            <a:r>
-              <a:rPr/>
-              <a:t>Impossible</a:t>
-            </a:r>
-          </a:p>
-          <a:p>
-            <a:pPr lvl="2"/>
-            <a:r>
-              <a:rPr/>
-              <a:t>Attribute variables</a:t>
-            </a:r>
-          </a:p>
-          <a:p>
-            <a:pPr lvl="2"/>
-            <a:r>
-              <a:rPr/>
-              <a:t>Retrospective studies</a:t>
+              <a:t>Avoids selection bias</a:t>
             </a:r>
           </a:p>
         </p:txBody>
@@ -59366,15 +59477,23 @@
             </a:pPr>
             <a:r>
               <a:rPr/>
-              <a:t>Some</a:t>
-            </a:r>
-            <a:r>
-              <a:rPr/>
-              <a:t> </a:t>
-            </a:r>
-            <a:r>
-              <a:rPr/>
-              <a:t>alternatives</a:t>
+              <a:t>Disadvantages</a:t>
+            </a:r>
+            <a:r>
+              <a:rPr/>
+              <a:t> </a:t>
+            </a:r>
+            <a:r>
+              <a:rPr/>
+              <a:t>of</a:t>
+            </a:r>
+            <a:r>
+              <a:rPr/>
+              <a:t> </a:t>
+            </a:r>
+            <a:r>
+              <a:rPr/>
+              <a:t>randomization</a:t>
             </a:r>
           </a:p>
         </p:txBody>
@@ -59397,35 +59516,28 @@
             <a:pPr lvl="1"/>
             <a:r>
               <a:rPr/>
-              <a:t>Wait list control groups</a:t>
+              <a:t>Expensive</a:t>
             </a:r>
           </a:p>
           <a:p>
             <a:pPr lvl="1"/>
             <a:r>
               <a:rPr/>
-              <a:t>Add on trials</a:t>
+              <a:t>Artificial</a:t>
             </a:r>
           </a:p>
           <a:p>
-            <a:pPr lvl="1"/>
-            <a:r>
-              <a:rPr/>
-              <a:t>Intensive versus standard advice</a:t>
+            <a:pPr lvl="2"/>
+            <a:r>
+              <a:rPr/>
+              <a:t>Extra tests, extra attention</a:t>
             </a:r>
           </a:p>
           <a:p>
-            <a:pPr lvl="1"/>
-            <a:r>
-              <a:rPr/>
-              <a:t>Randomly assign from a different end</a:t>
-            </a:r>
-          </a:p>
-          <a:p>
-            <a:pPr lvl="1"/>
-            <a:r>
-              <a:rPr/>
-              <a:t>Early stopping</a:t>
+            <a:pPr lvl="2"/>
+            <a:r>
+              <a:rPr/>
+              <a:t>Explicit acknowledgement of uncertainty</a:t>
             </a:r>
           </a:p>
         </p:txBody>
@@ -59472,47 +59584,31 @@
             </a:pPr>
             <a:r>
               <a:rPr/>
-              <a:t>Blinding/partial</a:t>
-            </a:r>
-            <a:r>
-              <a:rPr/>
-              <a:t> </a:t>
-            </a:r>
-            <a:r>
-              <a:rPr/>
-              <a:t>blinding.</a:t>
-            </a:r>
-            <a:r>
-              <a:rPr/>
-              <a:t> </a:t>
-            </a:r>
-            <a:r>
-              <a:rPr/>
-              <a:t>Who</a:t>
-            </a:r>
-            <a:r>
-              <a:rPr/>
-              <a:t> </a:t>
-            </a:r>
-            <a:r>
-              <a:rPr/>
-              <a:t>knew</a:t>
-            </a:r>
-            <a:r>
-              <a:rPr/>
-              <a:t> </a:t>
-            </a:r>
-            <a:r>
-              <a:rPr/>
-              <a:t>what</a:t>
-            </a:r>
-            <a:r>
-              <a:rPr/>
-              <a:t> </a:t>
-            </a:r>
-            <a:r>
-              <a:rPr/>
-              <a:t>when?</a:t>
+              <a:t>When</a:t>
+            </a:r>
+            <a:r>
+              <a:rPr/>
+              <a:t> </a:t>
+            </a:r>
+            <a:r>
+              <a:rPr/>
+              <a:t>can’t</a:t>
+            </a:r>
+            <a:r>
+              <a:rPr/>
+              <a:t> </a:t>
+            </a:r>
+            <a:r>
+              <a:rPr/>
+              <a:t>you</a:t>
+            </a:r>
+            <a:r>
+              <a:rPr/>
+              <a:t> </a:t>
+            </a:r>
+            <a:r>
+              <a:rPr/>
+              <a:t>randomize</a:t>
             </a:r>
           </a:p>
         </p:txBody>
@@ -59535,14 +59631,70 @@
             <a:pPr lvl="1"/>
             <a:r>
               <a:rPr/>
-              <a:t>Hiding information (not deception)</a:t>
+              <a:t>Unethical</a:t>
+            </a:r>
+          </a:p>
+          <a:p>
+            <a:pPr lvl="2"/>
+            <a:r>
+              <a:rPr/>
+              <a:t>Lack of equipoise</a:t>
+            </a:r>
+          </a:p>
+          <a:p>
+            <a:pPr lvl="2"/>
+            <a:r>
+              <a:rPr/>
+              <a:t>Harmful exposures</a:t>
             </a:r>
           </a:p>
           <a:p>
             <a:pPr lvl="1"/>
             <a:r>
               <a:rPr/>
-              <a:t>Not always possible (bilateral orchiectomy)</a:t>
+              <a:t>Impractical</a:t>
+            </a:r>
+          </a:p>
+          <a:p>
+            <a:pPr lvl="2"/>
+            <a:r>
+              <a:rPr/>
+              <a:t>Too many patients</a:t>
+            </a:r>
+          </a:p>
+          <a:p>
+            <a:pPr lvl="2"/>
+            <a:r>
+              <a:rPr/>
+              <a:t>Too much time</a:t>
+            </a:r>
+          </a:p>
+          <a:p>
+            <a:pPr lvl="2"/>
+            <a:r>
+              <a:rPr/>
+              <a:t>Strong patient preferences</a:t>
+            </a:r>
+          </a:p>
+          <a:p>
+            <a:pPr lvl="1"/>
+            <a:r>
+              <a:rPr/>
+              <a:t>Impossible</a:t>
+            </a:r>
+          </a:p>
+          <a:p>
+            <a:pPr lvl="2"/>
+            <a:r>
+              <a:rPr/>
+              <a:t>Attribute variables</a:t>
+            </a:r>
+          </a:p>
+          <a:p>
+            <a:pPr lvl="2"/>
+            <a:r>
+              <a:rPr/>
+              <a:t>Retrospective studies</a:t>
             </a:r>
           </a:p>
         </p:txBody>
@@ -59678,23 +59830,15 @@
             </a:pPr>
             <a:r>
               <a:rPr/>
-              <a:t>Types</a:t>
-            </a:r>
-            <a:r>
-              <a:rPr/>
-              <a:t> </a:t>
-            </a:r>
-            <a:r>
-              <a:rPr/>
-              <a:t>of</a:t>
-            </a:r>
-            <a:r>
-              <a:rPr/>
-              <a:t> </a:t>
-            </a:r>
-            <a:r>
-              <a:rPr/>
-              <a:t>blinding</a:t>
+              <a:t>Some</a:t>
+            </a:r>
+            <a:r>
+              <a:rPr/>
+              <a:t> </a:t>
+            </a:r>
+            <a:r>
+              <a:rPr/>
+              <a:t>alternatives</a:t>
             </a:r>
           </a:p>
         </p:txBody>
@@ -59717,42 +59861,35 @@
             <a:pPr lvl="1"/>
             <a:r>
               <a:rPr/>
-              <a:t>Double blind</a:t>
-            </a:r>
-          </a:p>
-          <a:p>
-            <a:pPr lvl="2"/>
-            <a:r>
-              <a:rPr/>
-              <a:t>Physician and patient blinded</a:t>
+              <a:t>Wait list control groups</a:t>
             </a:r>
           </a:p>
           <a:p>
             <a:pPr lvl="1"/>
             <a:r>
               <a:rPr/>
-              <a:t>Single blind</a:t>
-            </a:r>
-          </a:p>
-          <a:p>
-            <a:pPr lvl="2"/>
-            <a:r>
-              <a:rPr/>
-              <a:t>Patient only</a:t>
+              <a:t>Add on trials</a:t>
             </a:r>
           </a:p>
           <a:p>
             <a:pPr lvl="1"/>
             <a:r>
               <a:rPr/>
-              <a:t>Partial blind</a:t>
+              <a:t>Intensive versus standard advice</a:t>
             </a:r>
           </a:p>
           <a:p>
-            <a:pPr lvl="2"/>
-            <a:r>
-              <a:rPr/>
-              <a:t>Evaluators blinded</a:t>
+            <a:pPr lvl="1"/>
+            <a:r>
+              <a:rPr/>
+              <a:t>Randomly assign from a different end</a:t>
+            </a:r>
+          </a:p>
+          <a:p>
+            <a:pPr lvl="1"/>
+            <a:r>
+              <a:rPr/>
+              <a:t>Early stopping</a:t>
             </a:r>
           </a:p>
         </p:txBody>
@@ -59799,15 +59936,15 @@
             </a:pPr>
             <a:r>
               <a:rPr/>
-              <a:t>Hawthorne</a:t>
-            </a:r>
-            <a:r>
-              <a:rPr/>
-              <a:t> </a:t>
-            </a:r>
-            <a:r>
-              <a:rPr/>
-              <a:t>effect</a:t>
+              <a:t>Break</a:t>
+            </a:r>
+            <a:r>
+              <a:rPr/>
+              <a:t> </a:t>
+            </a:r>
+            <a:r>
+              <a:rPr/>
+              <a:t>#3</a:t>
             </a:r>
           </a:p>
         </p:txBody>
@@ -59830,21 +59967,42 @@
             <a:pPr lvl="1"/>
             <a:r>
               <a:rPr/>
-              <a:t>Series of studies at a GE factory.</a:t>
+              <a:t>What have you learned</a:t>
             </a:r>
           </a:p>
           <a:p>
             <a:pPr lvl="2"/>
             <a:r>
               <a:rPr/>
-              <a:t>Any change, no matter what, improved productivity</a:t>
+              <a:t>Advantages and disadvantages of randomization</a:t>
             </a:r>
           </a:p>
           <a:p>
             <a:pPr lvl="2"/>
             <a:r>
               <a:rPr/>
-              <a:t>Positive response to attention.</a:t>
+              <a:t>Alternatives to randomization</a:t>
+            </a:r>
+          </a:p>
+          <a:p>
+            <a:pPr lvl="1"/>
+            <a:r>
+              <a:rPr/>
+              <a:t>What’s next</a:t>
+            </a:r>
+          </a:p>
+          <a:p>
+            <a:pPr lvl="2"/>
+            <a:r>
+              <a:rPr/>
+              <a:t>Blinding</a:t>
+            </a:r>
+          </a:p>
+          <a:p>
+            <a:pPr lvl="2"/>
+            <a:r>
+              <a:rPr/>
+              <a:t>Subversion of randomization</a:t>
             </a:r>
           </a:p>
         </p:txBody>
@@ -59891,15 +60049,47 @@
             </a:pPr>
             <a:r>
               <a:rPr/>
-              <a:t>Ascertainment</a:t>
-            </a:r>
-            <a:r>
-              <a:rPr/>
-              <a:t> </a:t>
-            </a:r>
-            <a:r>
-              <a:rPr/>
-              <a:t>bias</a:t>
+              <a:t>Blinding/partial</a:t>
+            </a:r>
+            <a:r>
+              <a:rPr/>
+              <a:t> </a:t>
+            </a:r>
+            <a:r>
+              <a:rPr/>
+              <a:t>blinding.</a:t>
+            </a:r>
+            <a:r>
+              <a:rPr/>
+              <a:t> </a:t>
+            </a:r>
+            <a:r>
+              <a:rPr/>
+              <a:t>Who</a:t>
+            </a:r>
+            <a:r>
+              <a:rPr/>
+              <a:t> </a:t>
+            </a:r>
+            <a:r>
+              <a:rPr/>
+              <a:t>knew</a:t>
+            </a:r>
+            <a:r>
+              <a:rPr/>
+              <a:t> </a:t>
+            </a:r>
+            <a:r>
+              <a:rPr/>
+              <a:t>what</a:t>
+            </a:r>
+            <a:r>
+              <a:rPr/>
+              <a:t> </a:t>
+            </a:r>
+            <a:r>
+              <a:rPr/>
+              <a:t>when?</a:t>
             </a:r>
           </a:p>
         </p:txBody>
@@ -59922,31 +60112,14 @@
             <a:pPr lvl="1"/>
             <a:r>
               <a:rPr/>
-              <a:t>The tendency to self deception.</a:t>
-            </a:r>
-          </a:p>
-          <a:p>
-            <a:pPr lvl="2"/>
-            <a:r>
-              <a:rPr/>
-              <a:t>“Linus Pauling actively promoted the use of massive doses of vitamin C during the last few decades of his life. He believed it could cure just about anything from the common cold to cancer. During one interview he explained that after he and his family started taking Vitamin C supplements, they never had colds. The interviewer was a bit surprised probed a bit further ‘No colds? Ever?’ Linus Pauling responded, ‘Oh just an occasional sniffle.’”</a:t>
+              <a:t>Hiding information (not deception)</a:t>
             </a:r>
           </a:p>
           <a:p>
             <a:pPr lvl="1"/>
             <a:r>
               <a:rPr/>
-              <a:t>Steve Simon. StATS: Quantifying the ability of dreams to predict the future (April 10, 2007). Available in </a:t>
-            </a:r>
-            <a:r>
-              <a:rPr>
-                <a:hlinkClick r:id="rId3"/>
-              </a:rPr>
-              <a:t>html format</a:t>
-            </a:r>
-            <a:r>
-              <a:rPr/>
-              <a:t>.</a:t>
+              <a:t>Not always possible (bilateral orchiectomy)</a:t>
             </a:r>
           </a:p>
         </p:txBody>
@@ -59993,39 +60166,23 @@
             </a:pPr>
             <a:r>
               <a:rPr/>
-              <a:t>Confusion</a:t>
-            </a:r>
-            <a:r>
-              <a:rPr/>
-              <a:t> </a:t>
-            </a:r>
-            <a:r>
-              <a:rPr/>
-              <a:t>about</a:t>
-            </a:r>
-            <a:r>
-              <a:rPr/>
-              <a:t> </a:t>
-            </a:r>
-            <a:r>
-              <a:rPr/>
-              <a:t>the</a:t>
-            </a:r>
-            <a:r>
-              <a:rPr/>
-              <a:t> </a:t>
-            </a:r>
-            <a:r>
-              <a:rPr/>
-              <a:t>placebo</a:t>
-            </a:r>
-            <a:r>
-              <a:rPr/>
-              <a:t> </a:t>
-            </a:r>
-            <a:r>
-              <a:rPr/>
-              <a:t>effect</a:t>
+              <a:t>Types</a:t>
+            </a:r>
+            <a:r>
+              <a:rPr/>
+              <a:t> </a:t>
+            </a:r>
+            <a:r>
+              <a:rPr/>
+              <a:t>of</a:t>
+            </a:r>
+            <a:r>
+              <a:rPr/>
+              <a:t> </a:t>
+            </a:r>
+            <a:r>
+              <a:rPr/>
+              <a:t>blinding</a:t>
             </a:r>
           </a:p>
         </p:txBody>
@@ -60048,42 +60205,42 @@
             <a:pPr lvl="1"/>
             <a:r>
               <a:rPr/>
-              <a:t>Natural course of a disease</a:t>
+              <a:t>Double blind</a:t>
             </a:r>
           </a:p>
           <a:p>
             <a:pPr lvl="2"/>
             <a:r>
               <a:rPr/>
-              <a:t>“If a doctor treats your cold, it will go away in fourteen days. If you leave it alone, it will go away in two weeks.” Gloria Silverstein.</a:t>
+              <a:t>Physician and patient blinded</a:t>
+            </a:r>
+          </a:p>
+          <a:p>
+            <a:pPr lvl="1"/>
+            <a:r>
+              <a:rPr/>
+              <a:t>Single blind</a:t>
             </a:r>
           </a:p>
           <a:p>
             <a:pPr lvl="2"/>
             <a:r>
               <a:rPr/>
-              <a:t>“The art of medicine consists in amusing the patient while nature affects the cure.” Voltaire</a:t>
+              <a:t>Patient only</a:t>
             </a:r>
           </a:p>
           <a:p>
             <a:pPr lvl="1"/>
             <a:r>
               <a:rPr/>
-              <a:t>Regression to the mean</a:t>
+              <a:t>Partial blind</a:t>
             </a:r>
           </a:p>
           <a:p>
             <a:pPr lvl="2"/>
             <a:r>
               <a:rPr/>
-              <a:t>You’re never as good as you think you are on your good days and you’re never as bad as you think you are on your bad days.</a:t>
-            </a:r>
-          </a:p>
-          <a:p>
-            <a:pPr lvl="1"/>
-            <a:r>
-              <a:rPr/>
-              <a:t>Hróbjartsson and Gøtzsche study of placebo effect</a:t>
+              <a:t>Evaluators blinded</a:t>
             </a:r>
           </a:p>
         </p:txBody>
@@ -60130,39 +60287,15 @@
             </a:pPr>
             <a:r>
               <a:rPr/>
-              <a:t>Subversion</a:t>
-            </a:r>
-            <a:r>
-              <a:rPr/>
-              <a:t> </a:t>
-            </a:r>
-            <a:r>
-              <a:rPr/>
-              <a:t>of</a:t>
-            </a:r>
-            <a:r>
-              <a:rPr/>
-              <a:t> </a:t>
-            </a:r>
-            <a:r>
-              <a:rPr/>
-              <a:t>the</a:t>
-            </a:r>
-            <a:r>
-              <a:rPr/>
-              <a:t> </a:t>
-            </a:r>
-            <a:r>
-              <a:rPr/>
-              <a:t>randomization</a:t>
-            </a:r>
-            <a:r>
-              <a:rPr/>
-              <a:t> </a:t>
-            </a:r>
-            <a:r>
-              <a:rPr/>
-              <a:t>process</a:t>
+              <a:t>Hawthorne</a:t>
+            </a:r>
+            <a:r>
+              <a:rPr/>
+              <a:t> </a:t>
+            </a:r>
+            <a:r>
+              <a:rPr/>
+              <a:t>effect</a:t>
             </a:r>
           </a:p>
         </p:txBody>
@@ -60185,63 +60318,21 @@
             <a:pPr lvl="1"/>
             <a:r>
               <a:rPr/>
-              <a:t>Physician subversion</a:t>
+              <a:t>Series of studies at a GE factory.</a:t>
             </a:r>
           </a:p>
           <a:p>
             <a:pPr lvl="2"/>
             <a:r>
               <a:rPr/>
-              <a:t>Waiting until the right number pops up</a:t>
+              <a:t>Any change, no matter what, improved productivity</a:t>
             </a:r>
           </a:p>
           <a:p>
             <a:pPr lvl="2"/>
             <a:r>
               <a:rPr/>
-              <a:t>Biased implementation of exclusion criteria</a:t>
-            </a:r>
-          </a:p>
-          <a:p>
-            <a:pPr lvl="2"/>
-            <a:r>
-              <a:rPr/>
-              <a:t>Not a problem in single investigator trials</a:t>
-            </a:r>
-          </a:p>
-          <a:p>
-            <a:pPr lvl="1"/>
-            <a:r>
-              <a:rPr/>
-              <a:t>Hiding the randomization list.</a:t>
-            </a:r>
-          </a:p>
-          <a:p>
-            <a:pPr lvl="2"/>
-            <a:r>
-              <a:rPr/>
-              <a:t>Sealed envelopes</a:t>
-            </a:r>
-          </a:p>
-          <a:p>
-            <a:pPr lvl="2"/>
-            <a:r>
-              <a:rPr/>
-              <a:t>800 number</a:t>
-            </a:r>
-          </a:p>
-          <a:p>
-            <a:pPr lvl="1"/>
-            <a:r>
-              <a:rPr/>
-              <a:t>Patient subversion of the randomization process</a:t>
-            </a:r>
-          </a:p>
-          <a:p>
-            <a:pPr lvl="2"/>
-            <a:r>
-              <a:rPr/>
-              <a:t>Early anti-retroviral trials for AIDS</a:t>
+              <a:t>Positive response to attention.</a:t>
             </a:r>
           </a:p>
         </p:txBody>
@@ -60288,31 +60379,15 @@
             </a:pPr>
             <a:r>
               <a:rPr/>
-              <a:t>Problems</a:t>
-            </a:r>
-            <a:r>
-              <a:rPr/>
-              <a:t> </a:t>
-            </a:r>
-            <a:r>
-              <a:rPr/>
-              <a:t>with</a:t>
-            </a:r>
-            <a:r>
-              <a:rPr/>
-              <a:t> </a:t>
-            </a:r>
-            <a:r>
-              <a:rPr/>
-              <a:t>randomized</a:t>
-            </a:r>
-            <a:r>
-              <a:rPr/>
-              <a:t> </a:t>
-            </a:r>
-            <a:r>
-              <a:rPr/>
-              <a:t>trials</a:t>
+              <a:t>Ascertainment</a:t>
+            </a:r>
+            <a:r>
+              <a:rPr/>
+              <a:t> </a:t>
+            </a:r>
+            <a:r>
+              <a:rPr/>
+              <a:t>bias</a:t>
             </a:r>
           </a:p>
         </p:txBody>
@@ -60335,49 +60410,31 @@
             <a:pPr lvl="1"/>
             <a:r>
               <a:rPr/>
-              <a:t>Volunteer bias.</a:t>
+              <a:t>The tendency to self deception.</a:t>
             </a:r>
           </a:p>
           <a:p>
             <a:pPr lvl="2"/>
             <a:r>
               <a:rPr/>
-              <a:t>Willingness to endure painful procedures</a:t>
+              <a:t>“Linus Pauling actively promoted the use of massive doses of vitamin C during the last few decades of his life. He believed it could cure just about anything from the common cold to cancer. During one interview he explained that after he and his family started taking Vitamin C supplements, they never had colds. The interviewer was a bit surprised probed a bit further ‘No colds? Ever?’ Linus Pauling responded, ‘Oh just an occasional sniffle.’”</a:t>
             </a:r>
           </a:p>
           <a:p>
             <a:pPr lvl="1"/>
             <a:r>
               <a:rPr/>
-              <a:t>Professional volunteers</a:t>
-            </a:r>
-          </a:p>
-          <a:p>
-            <a:pPr lvl="1"/>
-            <a:r>
-              <a:rPr/>
-              <a:t>Strong personal preferences</a:t>
-            </a:r>
-          </a:p>
-          <a:p>
-            <a:pPr lvl="2"/>
-            <a:r>
-              <a:rPr/>
-              <a:t>Birth control methods</a:t>
-            </a:r>
-          </a:p>
-          <a:p>
-            <a:pPr lvl="2"/>
-            <a:r>
-              <a:rPr/>
-              <a:t>Surgical versus non-surgical trials</a:t>
-            </a:r>
-          </a:p>
-          <a:p>
-            <a:pPr lvl="2"/>
-            <a:r>
-              <a:rPr/>
-              <a:t>Less invasive surgery</a:t>
+              <a:t>Steve Simon. StATS: Quantifying the ability of dreams to predict the future (April 10, 2007). Available in </a:t>
+            </a:r>
+            <a:r>
+              <a:rPr>
+                <a:hlinkClick r:id="rId3"/>
+              </a:rPr>
+              <a:t>html format</a:t>
+            </a:r>
+            <a:r>
+              <a:rPr/>
+              <a:t>.</a:t>
             </a:r>
           </a:p>
         </p:txBody>
@@ -60424,31 +60481,39 @@
             </a:pPr>
             <a:r>
               <a:rPr/>
-              <a:t>Intention</a:t>
-            </a:r>
-            <a:r>
-              <a:rPr/>
-              <a:t> </a:t>
-            </a:r>
-            <a:r>
-              <a:rPr/>
-              <a:t>to</a:t>
-            </a:r>
-            <a:r>
-              <a:rPr/>
-              <a:t> </a:t>
-            </a:r>
-            <a:r>
-              <a:rPr/>
-              <a:t>treat</a:t>
-            </a:r>
-            <a:r>
-              <a:rPr/>
-              <a:t> </a:t>
-            </a:r>
-            <a:r>
-              <a:rPr/>
-              <a:t>analysis</a:t>
+              <a:t>Confusion</a:t>
+            </a:r>
+            <a:r>
+              <a:rPr/>
+              <a:t> </a:t>
+            </a:r>
+            <a:r>
+              <a:rPr/>
+              <a:t>about</a:t>
+            </a:r>
+            <a:r>
+              <a:rPr/>
+              <a:t> </a:t>
+            </a:r>
+            <a:r>
+              <a:rPr/>
+              <a:t>the</a:t>
+            </a:r>
+            <a:r>
+              <a:rPr/>
+              <a:t> </a:t>
+            </a:r>
+            <a:r>
+              <a:rPr/>
+              <a:t>placebo</a:t>
+            </a:r>
+            <a:r>
+              <a:rPr/>
+              <a:t> </a:t>
+            </a:r>
+            <a:r>
+              <a:rPr/>
+              <a:t>effect</a:t>
             </a:r>
           </a:p>
         </p:txBody>
@@ -60471,35 +60536,42 @@
             <a:pPr lvl="1"/>
             <a:r>
               <a:rPr/>
-              <a:t>Controversial</a:t>
+              <a:t>Natural course of a disease</a:t>
+            </a:r>
+          </a:p>
+          <a:p>
+            <a:pPr lvl="2"/>
+            <a:r>
+              <a:rPr/>
+              <a:t>“If a doctor treats your cold, it will go away in fourteen days. If you leave it alone, it will go away in two weeks.” Gloria Silverstein.</a:t>
+            </a:r>
+          </a:p>
+          <a:p>
+            <a:pPr lvl="2"/>
+            <a:r>
+              <a:rPr/>
+              <a:t>“The art of medicine consists in amusing the patient while nature affects the cure.” Voltaire</a:t>
             </a:r>
           </a:p>
           <a:p>
             <a:pPr lvl="1"/>
             <a:r>
               <a:rPr/>
-              <a:t>Analyze in groups originally randomized to</a:t>
+              <a:t>Regression to the mean</a:t>
             </a:r>
           </a:p>
           <a:p>
             <a:pPr lvl="2"/>
             <a:r>
               <a:rPr/>
-              <a:t>Maintains benefit of randomization</a:t>
-            </a:r>
-          </a:p>
-          <a:p>
-            <a:pPr lvl="2"/>
-            <a:r>
-              <a:rPr/>
-              <a:t>Measures practical impact of treatment</a:t>
+              <a:t>You’re never as good as you think you are on your good days and you’re never as bad as you think you are on your bad days.</a:t>
             </a:r>
           </a:p>
           <a:p>
             <a:pPr lvl="1"/>
             <a:r>
               <a:rPr/>
-              <a:t>Alternative: per protocol analysis</a:t>
+              <a:t>Hróbjartsson and Gøtzsche study of placebo effect</a:t>
             </a:r>
           </a:p>
         </p:txBody>
@@ -60546,15 +60618,39 @@
             </a:pPr>
             <a:r>
               <a:rPr/>
-              <a:t>Baseline</a:t>
-            </a:r>
-            <a:r>
-              <a:rPr/>
-              <a:t> </a:t>
-            </a:r>
-            <a:r>
-              <a:rPr/>
-              <a:t>measurements</a:t>
+              <a:t>Subversion</a:t>
+            </a:r>
+            <a:r>
+              <a:rPr/>
+              <a:t> </a:t>
+            </a:r>
+            <a:r>
+              <a:rPr/>
+              <a:t>of</a:t>
+            </a:r>
+            <a:r>
+              <a:rPr/>
+              <a:t> </a:t>
+            </a:r>
+            <a:r>
+              <a:rPr/>
+              <a:t>the</a:t>
+            </a:r>
+            <a:r>
+              <a:rPr/>
+              <a:t> </a:t>
+            </a:r>
+            <a:r>
+              <a:rPr/>
+              <a:t>randomization</a:t>
+            </a:r>
+            <a:r>
+              <a:rPr/>
+              <a:t> </a:t>
+            </a:r>
+            <a:r>
+              <a:rPr/>
+              <a:t>process</a:t>
             </a:r>
           </a:p>
         </p:txBody>
@@ -60577,42 +60673,319 @@
             <a:pPr lvl="1"/>
             <a:r>
               <a:rPr/>
-              <a:t>Not an absolute requirement</a:t>
+              <a:t>Physician subversion</a:t>
+            </a:r>
+          </a:p>
+          <a:p>
+            <a:pPr lvl="2"/>
+            <a:r>
+              <a:rPr/>
+              <a:t>Waiting until the right number pops up</a:t>
+            </a:r>
+          </a:p>
+          <a:p>
+            <a:pPr lvl="2"/>
+            <a:r>
+              <a:rPr/>
+              <a:t>Biased implementation of exclusion criteria</a:t>
+            </a:r>
+          </a:p>
+          <a:p>
+            <a:pPr lvl="2"/>
+            <a:r>
+              <a:rPr/>
+              <a:t>Not a problem in single investigator trials</a:t>
             </a:r>
           </a:p>
           <a:p>
             <a:pPr lvl="1"/>
             <a:r>
               <a:rPr/>
-              <a:t>Reduces variance</a:t>
+              <a:t>Hiding the randomization list.</a:t>
+            </a:r>
+          </a:p>
+          <a:p>
+            <a:pPr lvl="2"/>
+            <a:r>
+              <a:rPr/>
+              <a:t>Sealed envelopes</a:t>
+            </a:r>
+          </a:p>
+          <a:p>
+            <a:pPr lvl="2"/>
+            <a:r>
+              <a:rPr/>
+              <a:t>800 number</a:t>
             </a:r>
           </a:p>
           <a:p>
             <a:pPr lvl="1"/>
             <a:r>
               <a:rPr/>
-              <a:t>Allows quality checks</a:t>
+              <a:t>Patient subversion of the randomization process</a:t>
             </a:r>
           </a:p>
           <a:p>
             <a:pPr lvl="2"/>
             <a:r>
               <a:rPr/>
-              <a:t>Subversion of randomization</a:t>
+              <a:t>Early anti-retroviral trials for AIDS</a:t>
+            </a:r>
+          </a:p>
+        </p:txBody>
+      </p:sp>
+    </p:spTree>
+  </p:cSld>
+</p:sld>
+</file>
+
+<file path=ppt/slides/slide28.xml><?xml version="1.0" encoding="utf-8"?>
+<p:sld xmlns:a="http://schemas.openxmlformats.org/drawingml/2006/main" xmlns:r="http://schemas.openxmlformats.org/officeDocument/2006/relationships" xmlns:p="http://schemas.openxmlformats.org/presentationml/2006/main">
+  <p:cSld>
+    <p:spTree>
+      <p:nvGrpSpPr>
+        <p:cNvPr id="1" name=""/>
+        <p:cNvGrpSpPr/>
+        <p:nvPr/>
+      </p:nvGrpSpPr>
+      <p:grpSpPr>
+        <a:xfrm>
+          <a:off x="0" y="0"/>
+          <a:ext cx="0" cy="0"/>
+          <a:chOff x="0" y="0"/>
+          <a:chExt cx="0" cy="0"/>
+        </a:xfrm>
+      </p:grpSpPr>
+      <p:sp>
+        <p:nvSpPr>
+          <p:cNvPr id="2" name="Title 1"/>
+          <p:cNvSpPr>
+            <a:spLocks noGrp="1"/>
+          </p:cNvSpPr>
+          <p:nvPr>
+            <p:ph type="title"/>
+          </p:nvPr>
+        </p:nvSpPr>
+        <p:spPr/>
+        <p:txBody>
+          <a:bodyPr/>
+          <a:lstStyle/>
+          <a:p>
+            <a:pPr lvl="0" marL="0" indent="0">
+              <a:buNone/>
+            </a:pPr>
+            <a:r>
+              <a:rPr/>
+              <a:t>Break</a:t>
+            </a:r>
+            <a:r>
+              <a:rPr/>
+              <a:t> </a:t>
+            </a:r>
+            <a:r>
+              <a:rPr/>
+              <a:t>#4</a:t>
+            </a:r>
+          </a:p>
+        </p:txBody>
+      </p:sp>
+      <p:sp>
+        <p:nvSpPr>
+          <p:cNvPr id="3" name="Content Placeholder 2"/>
+          <p:cNvSpPr>
+            <a:spLocks noGrp="1"/>
+          </p:cNvSpPr>
+          <p:nvPr>
+            <p:ph idx="1"/>
+          </p:nvPr>
+        </p:nvSpPr>
+        <p:spPr/>
+        <p:txBody>
+          <a:bodyPr/>
+          <a:lstStyle/>
+          <a:p>
+            <a:pPr lvl="1"/>
+            <a:r>
+              <a:rPr/>
+              <a:t>What have you learned</a:t>
             </a:r>
           </a:p>
           <a:p>
             <a:pPr lvl="2"/>
             <a:r>
               <a:rPr/>
-              <a:t>Differential dropout</a:t>
+              <a:t>Blinding</a:t>
+            </a:r>
+          </a:p>
+          <a:p>
+            <a:pPr lvl="2"/>
+            <a:r>
+              <a:rPr/>
+              <a:t>Subversion of randomization</a:t>
             </a:r>
           </a:p>
           <a:p>
             <a:pPr lvl="1"/>
             <a:r>
               <a:rPr/>
-              <a:t>Several competing analysis strategies</a:t>
+              <a:t>What’s next</a:t>
+            </a:r>
+          </a:p>
+          <a:p>
+            <a:pPr lvl="2"/>
+            <a:r>
+              <a:rPr/>
+              <a:t>Problems with randomization</a:t>
+            </a:r>
+          </a:p>
+          <a:p>
+            <a:pPr lvl="2"/>
+            <a:r>
+              <a:rPr/>
+              <a:t>Intention to treat analysis</a:t>
+            </a:r>
+          </a:p>
+          <a:p>
+            <a:pPr lvl="2"/>
+            <a:r>
+              <a:rPr/>
+              <a:t>Baseline measurements</a:t>
+            </a:r>
+          </a:p>
+        </p:txBody>
+      </p:sp>
+    </p:spTree>
+  </p:cSld>
+</p:sld>
+</file>
+
+<file path=ppt/slides/slide29.xml><?xml version="1.0" encoding="utf-8"?>
+<p:sld xmlns:a="http://schemas.openxmlformats.org/drawingml/2006/main" xmlns:r="http://schemas.openxmlformats.org/officeDocument/2006/relationships" xmlns:p="http://schemas.openxmlformats.org/presentationml/2006/main">
+  <p:cSld>
+    <p:spTree>
+      <p:nvGrpSpPr>
+        <p:cNvPr id="1" name=""/>
+        <p:cNvGrpSpPr/>
+        <p:nvPr/>
+      </p:nvGrpSpPr>
+      <p:grpSpPr>
+        <a:xfrm>
+          <a:off x="0" y="0"/>
+          <a:ext cx="0" cy="0"/>
+          <a:chOff x="0" y="0"/>
+          <a:chExt cx="0" cy="0"/>
+        </a:xfrm>
+      </p:grpSpPr>
+      <p:sp>
+        <p:nvSpPr>
+          <p:cNvPr id="2" name="Title 1"/>
+          <p:cNvSpPr>
+            <a:spLocks noGrp="1"/>
+          </p:cNvSpPr>
+          <p:nvPr>
+            <p:ph type="title"/>
+          </p:nvPr>
+        </p:nvSpPr>
+        <p:spPr/>
+        <p:txBody>
+          <a:bodyPr/>
+          <a:lstStyle/>
+          <a:p>
+            <a:pPr lvl="0" marL="0" indent="0">
+              <a:buNone/>
+            </a:pPr>
+            <a:r>
+              <a:rPr/>
+              <a:t>Problems</a:t>
+            </a:r>
+            <a:r>
+              <a:rPr/>
+              <a:t> </a:t>
+            </a:r>
+            <a:r>
+              <a:rPr/>
+              <a:t>with</a:t>
+            </a:r>
+            <a:r>
+              <a:rPr/>
+              <a:t> </a:t>
+            </a:r>
+            <a:r>
+              <a:rPr/>
+              <a:t>randomized</a:t>
+            </a:r>
+            <a:r>
+              <a:rPr/>
+              <a:t> </a:t>
+            </a:r>
+            <a:r>
+              <a:rPr/>
+              <a:t>trials</a:t>
+            </a:r>
+          </a:p>
+        </p:txBody>
+      </p:sp>
+      <p:sp>
+        <p:nvSpPr>
+          <p:cNvPr id="3" name="Content Placeholder 2"/>
+          <p:cNvSpPr>
+            <a:spLocks noGrp="1"/>
+          </p:cNvSpPr>
+          <p:nvPr>
+            <p:ph idx="1"/>
+          </p:nvPr>
+        </p:nvSpPr>
+        <p:spPr/>
+        <p:txBody>
+          <a:bodyPr/>
+          <a:lstStyle/>
+          <a:p>
+            <a:pPr lvl="1"/>
+            <a:r>
+              <a:rPr/>
+              <a:t>Volunteer bias.</a:t>
+            </a:r>
+          </a:p>
+          <a:p>
+            <a:pPr lvl="2"/>
+            <a:r>
+              <a:rPr/>
+              <a:t>Willingness to endure painful procedures</a:t>
+            </a:r>
+          </a:p>
+          <a:p>
+            <a:pPr lvl="1"/>
+            <a:r>
+              <a:rPr/>
+              <a:t>Professional volunteers</a:t>
+            </a:r>
+          </a:p>
+          <a:p>
+            <a:pPr lvl="1"/>
+            <a:r>
+              <a:rPr/>
+              <a:t>Strong personal preferences</a:t>
+            </a:r>
+          </a:p>
+          <a:p>
+            <a:pPr lvl="2"/>
+            <a:r>
+              <a:rPr/>
+              <a:t>Birth control methods</a:t>
+            </a:r>
+          </a:p>
+          <a:p>
+            <a:pPr lvl="2"/>
+            <a:r>
+              <a:rPr/>
+              <a:t>Surgical versus non-surgical trials</a:t>
+            </a:r>
+          </a:p>
+          <a:p>
+            <a:pPr lvl="2"/>
+            <a:r>
+              <a:rPr/>
+              <a:t>Less invasive surgery</a:t>
             </a:r>
           </a:p>
         </p:txBody>
@@ -60789,6 +61162,374 @@
 </p:sld>
 </file>
 
+<file path=ppt/slides/slide30.xml><?xml version="1.0" encoding="utf-8"?>
+<p:sld xmlns:a="http://schemas.openxmlformats.org/drawingml/2006/main" xmlns:r="http://schemas.openxmlformats.org/officeDocument/2006/relationships" xmlns:p="http://schemas.openxmlformats.org/presentationml/2006/main">
+  <p:cSld>
+    <p:spTree>
+      <p:nvGrpSpPr>
+        <p:cNvPr id="1" name=""/>
+        <p:cNvGrpSpPr/>
+        <p:nvPr/>
+      </p:nvGrpSpPr>
+      <p:grpSpPr>
+        <a:xfrm>
+          <a:off x="0" y="0"/>
+          <a:ext cx="0" cy="0"/>
+          <a:chOff x="0" y="0"/>
+          <a:chExt cx="0" cy="0"/>
+        </a:xfrm>
+      </p:grpSpPr>
+      <p:sp>
+        <p:nvSpPr>
+          <p:cNvPr id="2" name="Title 1"/>
+          <p:cNvSpPr>
+            <a:spLocks noGrp="1"/>
+          </p:cNvSpPr>
+          <p:nvPr>
+            <p:ph type="title"/>
+          </p:nvPr>
+        </p:nvSpPr>
+        <p:spPr/>
+        <p:txBody>
+          <a:bodyPr/>
+          <a:lstStyle/>
+          <a:p>
+            <a:pPr lvl="0" marL="0" indent="0">
+              <a:buNone/>
+            </a:pPr>
+            <a:r>
+              <a:rPr/>
+              <a:t>Intention</a:t>
+            </a:r>
+            <a:r>
+              <a:rPr/>
+              <a:t> </a:t>
+            </a:r>
+            <a:r>
+              <a:rPr/>
+              <a:t>to</a:t>
+            </a:r>
+            <a:r>
+              <a:rPr/>
+              <a:t> </a:t>
+            </a:r>
+            <a:r>
+              <a:rPr/>
+              <a:t>treat</a:t>
+            </a:r>
+            <a:r>
+              <a:rPr/>
+              <a:t> </a:t>
+            </a:r>
+            <a:r>
+              <a:rPr/>
+              <a:t>analysis</a:t>
+            </a:r>
+          </a:p>
+        </p:txBody>
+      </p:sp>
+      <p:sp>
+        <p:nvSpPr>
+          <p:cNvPr id="3" name="Content Placeholder 2"/>
+          <p:cNvSpPr>
+            <a:spLocks noGrp="1"/>
+          </p:cNvSpPr>
+          <p:nvPr>
+            <p:ph idx="1"/>
+          </p:nvPr>
+        </p:nvSpPr>
+        <p:spPr/>
+        <p:txBody>
+          <a:bodyPr/>
+          <a:lstStyle/>
+          <a:p>
+            <a:pPr lvl="1"/>
+            <a:r>
+              <a:rPr/>
+              <a:t>Controversial</a:t>
+            </a:r>
+          </a:p>
+          <a:p>
+            <a:pPr lvl="1"/>
+            <a:r>
+              <a:rPr/>
+              <a:t>Analyze in groups originally randomized to</a:t>
+            </a:r>
+          </a:p>
+          <a:p>
+            <a:pPr lvl="2"/>
+            <a:r>
+              <a:rPr/>
+              <a:t>Maintains benefit of randomization</a:t>
+            </a:r>
+          </a:p>
+          <a:p>
+            <a:pPr lvl="2"/>
+            <a:r>
+              <a:rPr/>
+              <a:t>Measures practical impact of treatment</a:t>
+            </a:r>
+          </a:p>
+          <a:p>
+            <a:pPr lvl="1"/>
+            <a:r>
+              <a:rPr/>
+              <a:t>Alternative: per protocol analysis</a:t>
+            </a:r>
+          </a:p>
+        </p:txBody>
+      </p:sp>
+    </p:spTree>
+  </p:cSld>
+</p:sld>
+</file>
+
+<file path=ppt/slides/slide31.xml><?xml version="1.0" encoding="utf-8"?>
+<p:sld xmlns:a="http://schemas.openxmlformats.org/drawingml/2006/main" xmlns:r="http://schemas.openxmlformats.org/officeDocument/2006/relationships" xmlns:p="http://schemas.openxmlformats.org/presentationml/2006/main">
+  <p:cSld>
+    <p:spTree>
+      <p:nvGrpSpPr>
+        <p:cNvPr id="1" name=""/>
+        <p:cNvGrpSpPr/>
+        <p:nvPr/>
+      </p:nvGrpSpPr>
+      <p:grpSpPr>
+        <a:xfrm>
+          <a:off x="0" y="0"/>
+          <a:ext cx="0" cy="0"/>
+          <a:chOff x="0" y="0"/>
+          <a:chExt cx="0" cy="0"/>
+        </a:xfrm>
+      </p:grpSpPr>
+      <p:sp>
+        <p:nvSpPr>
+          <p:cNvPr id="2" name="Title 1"/>
+          <p:cNvSpPr>
+            <a:spLocks noGrp="1"/>
+          </p:cNvSpPr>
+          <p:nvPr>
+            <p:ph type="title"/>
+          </p:nvPr>
+        </p:nvSpPr>
+        <p:spPr/>
+        <p:txBody>
+          <a:bodyPr/>
+          <a:lstStyle/>
+          <a:p>
+            <a:pPr lvl="0" marL="0" indent="0">
+              <a:buNone/>
+            </a:pPr>
+            <a:r>
+              <a:rPr/>
+              <a:t>Baseline</a:t>
+            </a:r>
+            <a:r>
+              <a:rPr/>
+              <a:t> </a:t>
+            </a:r>
+            <a:r>
+              <a:rPr/>
+              <a:t>measurements</a:t>
+            </a:r>
+          </a:p>
+        </p:txBody>
+      </p:sp>
+      <p:sp>
+        <p:nvSpPr>
+          <p:cNvPr id="3" name="Content Placeholder 2"/>
+          <p:cNvSpPr>
+            <a:spLocks noGrp="1"/>
+          </p:cNvSpPr>
+          <p:nvPr>
+            <p:ph idx="1"/>
+          </p:nvPr>
+        </p:nvSpPr>
+        <p:spPr/>
+        <p:txBody>
+          <a:bodyPr/>
+          <a:lstStyle/>
+          <a:p>
+            <a:pPr lvl="1"/>
+            <a:r>
+              <a:rPr/>
+              <a:t>Not an absolute requirement</a:t>
+            </a:r>
+          </a:p>
+          <a:p>
+            <a:pPr lvl="1"/>
+            <a:r>
+              <a:rPr/>
+              <a:t>Reduces variance</a:t>
+            </a:r>
+          </a:p>
+          <a:p>
+            <a:pPr lvl="1"/>
+            <a:r>
+              <a:rPr/>
+              <a:t>Allows quality checks</a:t>
+            </a:r>
+          </a:p>
+          <a:p>
+            <a:pPr lvl="2"/>
+            <a:r>
+              <a:rPr/>
+              <a:t>Subversion of randomization</a:t>
+            </a:r>
+          </a:p>
+          <a:p>
+            <a:pPr lvl="2"/>
+            <a:r>
+              <a:rPr/>
+              <a:t>Differential dropout</a:t>
+            </a:r>
+          </a:p>
+          <a:p>
+            <a:pPr lvl="1"/>
+            <a:r>
+              <a:rPr/>
+              <a:t>Several competing analysis strategies</a:t>
+            </a:r>
+          </a:p>
+        </p:txBody>
+      </p:sp>
+    </p:spTree>
+  </p:cSld>
+</p:sld>
+</file>
+
+<file path=ppt/slides/slide32.xml><?xml version="1.0" encoding="utf-8"?>
+<p:sld xmlns:a="http://schemas.openxmlformats.org/drawingml/2006/main" xmlns:r="http://schemas.openxmlformats.org/officeDocument/2006/relationships" xmlns:p="http://schemas.openxmlformats.org/presentationml/2006/main">
+  <p:cSld>
+    <p:spTree>
+      <p:nvGrpSpPr>
+        <p:cNvPr id="1" name=""/>
+        <p:cNvGrpSpPr/>
+        <p:nvPr/>
+      </p:nvGrpSpPr>
+      <p:grpSpPr>
+        <a:xfrm>
+          <a:off x="0" y="0"/>
+          <a:ext cx="0" cy="0"/>
+          <a:chOff x="0" y="0"/>
+          <a:chExt cx="0" cy="0"/>
+        </a:xfrm>
+      </p:grpSpPr>
+      <p:sp>
+        <p:nvSpPr>
+          <p:cNvPr id="2" name="Title 1"/>
+          <p:cNvSpPr>
+            <a:spLocks noGrp="1"/>
+          </p:cNvSpPr>
+          <p:nvPr>
+            <p:ph type="title"/>
+          </p:nvPr>
+        </p:nvSpPr>
+        <p:spPr/>
+        <p:txBody>
+          <a:bodyPr/>
+          <a:lstStyle/>
+          <a:p>
+            <a:pPr lvl="0" marL="0" indent="0">
+              <a:buNone/>
+            </a:pPr>
+            <a:r>
+              <a:rPr/>
+              <a:t>Conclusion</a:t>
+            </a:r>
+          </a:p>
+        </p:txBody>
+      </p:sp>
+      <p:sp>
+        <p:nvSpPr>
+          <p:cNvPr id="3" name="Content Placeholder 2"/>
+          <p:cNvSpPr>
+            <a:spLocks noGrp="1"/>
+          </p:cNvSpPr>
+          <p:nvPr>
+            <p:ph idx="1"/>
+          </p:nvPr>
+        </p:nvSpPr>
+        <p:spPr/>
+        <p:txBody>
+          <a:bodyPr/>
+          <a:lstStyle/>
+          <a:p>
+            <a:pPr lvl="1"/>
+            <a:r>
+              <a:rPr/>
+              <a:t>What have you learned</a:t>
+            </a:r>
+          </a:p>
+          <a:p>
+            <a:pPr lvl="2"/>
+            <a:r>
+              <a:rPr/>
+              <a:t>Distinction between experimental, quasi-experimental, and observational studies</a:t>
+            </a:r>
+          </a:p>
+          <a:p>
+            <a:pPr lvl="2"/>
+            <a:r>
+              <a:rPr/>
+              <a:t>How to randomize</a:t>
+            </a:r>
+          </a:p>
+          <a:p>
+            <a:pPr lvl="2"/>
+            <a:r>
+              <a:rPr/>
+              <a:t>Advantages and disadvantages of randomization</a:t>
+            </a:r>
+          </a:p>
+          <a:p>
+            <a:pPr lvl="2"/>
+            <a:r>
+              <a:rPr/>
+              <a:t>Blinding</a:t>
+            </a:r>
+          </a:p>
+          <a:p>
+            <a:pPr lvl="2"/>
+            <a:r>
+              <a:rPr/>
+              <a:t>Problems with randomization</a:t>
+            </a:r>
+          </a:p>
+          <a:p>
+            <a:pPr lvl="2"/>
+            <a:r>
+              <a:rPr/>
+              <a:t>Intention to treat analysis</a:t>
+            </a:r>
+          </a:p>
+          <a:p>
+            <a:pPr lvl="2"/>
+            <a:r>
+              <a:rPr/>
+              <a:t>Baseline measurements</a:t>
+            </a:r>
+          </a:p>
+          <a:p>
+            <a:pPr lvl="1"/>
+            <a:r>
+              <a:rPr/>
+              <a:t>Next lecture</a:t>
+            </a:r>
+          </a:p>
+          <a:p>
+            <a:pPr lvl="2"/>
+            <a:r>
+              <a:rPr/>
+              <a:t>Quasi-experimental design</a:t>
+            </a:r>
+          </a:p>
+        </p:txBody>
+      </p:sp>
+    </p:spTree>
+  </p:cSld>
+</p:sld>
+</file>
+
 <file path=ppt/slides/slide4.xml><?xml version="1.0" encoding="utf-8"?>
 <p:sld xmlns:a="http://schemas.openxmlformats.org/drawingml/2006/main" xmlns:r="http://schemas.openxmlformats.org/officeDocument/2006/relationships" xmlns:p="http://schemas.openxmlformats.org/presentationml/2006/main">
   <p:cSld>
@@ -60931,7 +61672,7 @@
             <a:pPr lvl="2"/>
             <a:r>
               <a:rPr/>
-              <a:t>Number of secual partners</a:t>
+              <a:t>Number of sexual partners</a:t>
             </a:r>
           </a:p>
           <a:p>
@@ -61220,23 +61961,15 @@
             </a:pPr>
             <a:r>
               <a:rPr/>
-              <a:t>How</a:t>
-            </a:r>
-            <a:r>
-              <a:rPr/>
-              <a:t> </a:t>
-            </a:r>
-            <a:r>
-              <a:rPr/>
-              <a:t>to</a:t>
-            </a:r>
-            <a:r>
-              <a:rPr/>
-              <a:t> </a:t>
-            </a:r>
-            <a:r>
-              <a:rPr/>
-              <a:t>randomize</a:t>
+              <a:t>Break</a:t>
+            </a:r>
+            <a:r>
+              <a:rPr/>
+              <a:t> </a:t>
+            </a:r>
+            <a:r>
+              <a:rPr/>
+              <a:t>#1</a:t>
             </a:r>
           </a:p>
         </p:txBody>
@@ -61259,42 +61992,42 @@
             <a:pPr lvl="1"/>
             <a:r>
               <a:rPr/>
-              <a:t>Use of a random device</a:t>
+              <a:t>What have you learned</a:t>
             </a:r>
           </a:p>
           <a:p>
             <a:pPr lvl="2"/>
             <a:r>
               <a:rPr/>
-              <a:t>Physical devices (flip of a coin, balls in an urn)</a:t>
+              <a:t>Examples where randomization was needed</a:t>
             </a:r>
           </a:p>
           <a:p>
             <a:pPr lvl="2"/>
             <a:r>
               <a:rPr/>
-              <a:t>Computer generated random numbers</a:t>
+              <a:t>Distinction between experimental, quasi-experimental, and observational studies</a:t>
             </a:r>
           </a:p>
           <a:p>
             <a:pPr lvl="1"/>
             <a:r>
               <a:rPr/>
-              <a:t>Avoid haphazard approaches</a:t>
+              <a:t>What’s next</a:t>
             </a:r>
           </a:p>
           <a:p>
-            <a:pPr lvl="1"/>
-            <a:r>
-              <a:rPr/>
-              <a:t>Avoid alternating assignment</a:t>
+            <a:pPr lvl="2"/>
+            <a:r>
+              <a:rPr/>
+              <a:t>How to randomize</a:t>
             </a:r>
           </a:p>
           <a:p>
-            <a:pPr lvl="1"/>
-            <a:r>
-              <a:rPr/>
-              <a:t>Remember the law of large numbers</a:t>
+            <a:pPr lvl="2"/>
+            <a:r>
+              <a:rPr/>
+              <a:t>Fishy example of randomization</a:t>
             </a:r>
           </a:p>
         </p:txBody>
@@ -61305,6 +62038,127 @@
 </file>
 
 <file path=ppt/slides/slide8.xml><?xml version="1.0" encoding="utf-8"?>
+<p:sld xmlns:a="http://schemas.openxmlformats.org/drawingml/2006/main" xmlns:r="http://schemas.openxmlformats.org/officeDocument/2006/relationships" xmlns:p="http://schemas.openxmlformats.org/presentationml/2006/main">
+  <p:cSld>
+    <p:spTree>
+      <p:nvGrpSpPr>
+        <p:cNvPr id="1" name=""/>
+        <p:cNvGrpSpPr/>
+        <p:nvPr/>
+      </p:nvGrpSpPr>
+      <p:grpSpPr>
+        <a:xfrm>
+          <a:off x="0" y="0"/>
+          <a:ext cx="0" cy="0"/>
+          <a:chOff x="0" y="0"/>
+          <a:chExt cx="0" cy="0"/>
+        </a:xfrm>
+      </p:grpSpPr>
+      <p:sp>
+        <p:nvSpPr>
+          <p:cNvPr id="2" name="Title 1"/>
+          <p:cNvSpPr>
+            <a:spLocks noGrp="1"/>
+          </p:cNvSpPr>
+          <p:nvPr>
+            <p:ph type="title"/>
+          </p:nvPr>
+        </p:nvSpPr>
+        <p:spPr/>
+        <p:txBody>
+          <a:bodyPr/>
+          <a:lstStyle/>
+          <a:p>
+            <a:pPr lvl="0" marL="0" indent="0">
+              <a:buNone/>
+            </a:pPr>
+            <a:r>
+              <a:rPr/>
+              <a:t>How</a:t>
+            </a:r>
+            <a:r>
+              <a:rPr/>
+              <a:t> </a:t>
+            </a:r>
+            <a:r>
+              <a:rPr/>
+              <a:t>to</a:t>
+            </a:r>
+            <a:r>
+              <a:rPr/>
+              <a:t> </a:t>
+            </a:r>
+            <a:r>
+              <a:rPr/>
+              <a:t>randomize</a:t>
+            </a:r>
+          </a:p>
+        </p:txBody>
+      </p:sp>
+      <p:sp>
+        <p:nvSpPr>
+          <p:cNvPr id="3" name="Content Placeholder 2"/>
+          <p:cNvSpPr>
+            <a:spLocks noGrp="1"/>
+          </p:cNvSpPr>
+          <p:nvPr>
+            <p:ph idx="1"/>
+          </p:nvPr>
+        </p:nvSpPr>
+        <p:spPr/>
+        <p:txBody>
+          <a:bodyPr/>
+          <a:lstStyle/>
+          <a:p>
+            <a:pPr lvl="1"/>
+            <a:r>
+              <a:rPr/>
+              <a:t>Use of a random device</a:t>
+            </a:r>
+          </a:p>
+          <a:p>
+            <a:pPr lvl="2"/>
+            <a:r>
+              <a:rPr/>
+              <a:t>Physical devices (flip of a coin, balls in an urn)</a:t>
+            </a:r>
+          </a:p>
+          <a:p>
+            <a:pPr lvl="2"/>
+            <a:r>
+              <a:rPr/>
+              <a:t>Computer generated random numbers</a:t>
+            </a:r>
+          </a:p>
+          <a:p>
+            <a:pPr lvl="1"/>
+            <a:r>
+              <a:rPr/>
+              <a:t>Avoid haphazard approaches</a:t>
+            </a:r>
+          </a:p>
+          <a:p>
+            <a:pPr lvl="1"/>
+            <a:r>
+              <a:rPr/>
+              <a:t>Avoid alternating assignment</a:t>
+            </a:r>
+          </a:p>
+          <a:p>
+            <a:pPr lvl="1"/>
+            <a:r>
+              <a:rPr/>
+              <a:t>Remember the law of large numbers</a:t>
+            </a:r>
+          </a:p>
+        </p:txBody>
+      </p:sp>
+    </p:spTree>
+  </p:cSld>
+</p:sld>
+</file>
+
+<file path=ppt/slides/slide9.xml><?xml version="1.0" encoding="utf-8"?>
 <p:sld xmlns:a="http://schemas.openxmlformats.org/drawingml/2006/main" xmlns:r="http://schemas.openxmlformats.org/officeDocument/2006/relationships" xmlns:p="http://schemas.openxmlformats.org/presentationml/2006/main">
   <p:cSld>
     <p:spTree>
@@ -61506,241 +62360,6 @@
             <a:r>
               <a:rPr/>
               <a:t>big</a:t>
-            </a:r>
-            <a:r>
-              <a:rPr/>
-              <a:t> </a:t>
-            </a:r>
-            <a:r>
-              <a:rPr/>
-              <a:t>tank</a:t>
-            </a:r>
-          </a:p>
-        </p:txBody>
-      </p:sp>
-    </p:spTree>
-  </p:cSld>
-</p:sld>
-</file>
-
-<file path=ppt/slides/slide9.xml><?xml version="1.0" encoding="utf-8"?>
-<p:sld xmlns:a="http://schemas.openxmlformats.org/drawingml/2006/main" xmlns:r="http://schemas.openxmlformats.org/officeDocument/2006/relationships" xmlns:p="http://schemas.openxmlformats.org/presentationml/2006/main">
-  <p:cSld>
-    <p:spTree>
-      <p:nvGrpSpPr>
-        <p:cNvPr id="1" name=""/>
-        <p:cNvGrpSpPr/>
-        <p:nvPr/>
-      </p:nvGrpSpPr>
-      <p:grpSpPr>
-        <a:xfrm>
-          <a:off x="0" y="0"/>
-          <a:ext cx="0" cy="0"/>
-          <a:chOff x="0" y="0"/>
-          <a:chExt cx="0" cy="0"/>
-        </a:xfrm>
-      </p:grpSpPr>
-      <p:sp>
-        <p:nvSpPr>
-          <p:cNvPr id="2" name="Title 1"/>
-          <p:cNvSpPr>
-            <a:spLocks noGrp="1"/>
-          </p:cNvSpPr>
-          <p:nvPr>
-            <p:ph type="title"/>
-          </p:nvPr>
-        </p:nvSpPr>
-        <p:spPr/>
-        <p:txBody>
-          <a:bodyPr/>
-          <a:lstStyle/>
-          <a:p>
-            <a:pPr lvl="0" marL="0" indent="0">
-              <a:buNone/>
-            </a:pPr>
-            <a:r>
-              <a:rPr/>
-              <a:t>A</a:t>
-            </a:r>
-            <a:r>
-              <a:rPr/>
-              <a:t> </a:t>
-            </a:r>
-            <a:r>
-              <a:rPr/>
-              <a:t>fishy</a:t>
-            </a:r>
-            <a:r>
-              <a:rPr/>
-              <a:t> </a:t>
-            </a:r>
-            <a:r>
-              <a:rPr/>
-              <a:t>research</a:t>
-            </a:r>
-            <a:r>
-              <a:rPr/>
-              <a:t> </a:t>
-            </a:r>
-            <a:r>
-              <a:rPr/>
-              <a:t>story</a:t>
-            </a:r>
-            <a:r>
-              <a:rPr/>
-              <a:t> </a:t>
-            </a:r>
-            <a:r>
-              <a:rPr/>
-              <a:t>(part</a:t>
-            </a:r>
-            <a:r>
-              <a:rPr/>
-              <a:t> </a:t>
-            </a:r>
-            <a:r>
-              <a:rPr/>
-              <a:t>2</a:t>
-            </a:r>
-            <a:r>
-              <a:rPr/>
-              <a:t> </a:t>
-            </a:r>
-            <a:r>
-              <a:rPr/>
-              <a:t>of</a:t>
-            </a:r>
-            <a:r>
-              <a:rPr/>
-              <a:t> </a:t>
-            </a:r>
-            <a:r>
-              <a:rPr/>
-              <a:t>7)</a:t>
-            </a:r>
-          </a:p>
-        </p:txBody>
-      </p:sp>
-      <p:pic>
-        <p:nvPicPr>
-          <p:cNvPr descr="../images/04/fishy02.png" id="0" name="Picture 1"/>
-          <p:cNvPicPr>
-            <a:picLocks noGrp="1" noChangeAspect="1"/>
-          </p:cNvPicPr>
-          <p:nvPr/>
-        </p:nvPicPr>
-        <p:blipFill>
-          <a:blip r:embed="rId3"/>
-          <a:stretch>
-            <a:fillRect/>
-          </a:stretch>
-        </p:blipFill>
-        <p:spPr bwMode="auto">
-          <a:xfrm>
-            <a:off x="1892300" y="1600200"/>
-            <a:ext cx="5346700" cy="4013200"/>
-          </a:xfrm>
-          <a:prstGeom prst="rect">
-            <a:avLst/>
-          </a:prstGeom>
-          <a:noFill/>
-          <a:ln w="9525">
-            <a:noFill/>
-            <a:headEnd/>
-            <a:tailEnd/>
-          </a:ln>
-        </p:spPr>
-      </p:pic>
-      <p:sp>
-        <p:nvSpPr>
-          <p:cNvPr id="1" name="TextBox 3"/>
-          <p:cNvSpPr txBox="1"/>
-          <p:nvPr/>
-        </p:nvSpPr>
-        <p:spPr>
-          <a:xfrm>
-            <a:off x="457200" y="5613400"/>
-            <a:ext cx="8229600" cy="508000"/>
-          </a:xfrm>
-          <a:prstGeom prst="rect">
-            <a:avLst/>
-          </a:prstGeom>
-          <a:noFill/>
-        </p:spPr>
-        <p:txBody>
-          <a:bodyPr/>
-          <a:lstStyle/>
-          <a:p>
-            <a:pPr lvl="0" marL="0" indent="0" algn="ctr">
-              <a:buNone/>
-            </a:pPr>
-            <a:r>
-              <a:rPr/>
-              <a:t>Figure</a:t>
-            </a:r>
-            <a:r>
-              <a:rPr/>
-              <a:t> </a:t>
-            </a:r>
-            <a:r>
-              <a:rPr/>
-              <a:t>2.</a:t>
-            </a:r>
-            <a:r>
-              <a:rPr/>
-              <a:t> </a:t>
-            </a:r>
-            <a:r>
-              <a:rPr/>
-              <a:t>First</a:t>
-            </a:r>
-            <a:r>
-              <a:rPr/>
-              <a:t> </a:t>
-            </a:r>
-            <a:r>
-              <a:rPr/>
-              <a:t>six</a:t>
-            </a:r>
-            <a:r>
-              <a:rPr/>
-              <a:t> </a:t>
-            </a:r>
-            <a:r>
-              <a:rPr/>
-              <a:t>fish</a:t>
-            </a:r>
-            <a:r>
-              <a:rPr/>
-              <a:t> </a:t>
-            </a:r>
-            <a:r>
-              <a:rPr/>
-              <a:t>go</a:t>
-            </a:r>
-            <a:r>
-              <a:rPr/>
-              <a:t> </a:t>
-            </a:r>
-            <a:r>
-              <a:rPr/>
-              <a:t>in</a:t>
-            </a:r>
-            <a:r>
-              <a:rPr/>
-              <a:t> </a:t>
-            </a:r>
-            <a:r>
-              <a:rPr/>
-              <a:t>the</a:t>
-            </a:r>
-            <a:r>
-              <a:rPr/>
-              <a:t> </a:t>
-            </a:r>
-            <a:r>
-              <a:rPr/>
-              <a:t>first</a:t>
             </a:r>
             <a:r>
               <a:rPr/>

</xml_diff>

<commit_message>
Updated video14 in Clinical Research Methodology
</commit_message>
<xml_diff>
--- a/clinical-research-methodology/results/video04-randomized-trials.pptx
+++ b/clinical-research-methodology/results/video04-randomized-trials.pptx
@@ -1,6 +1,6 @@
 
 <file path=ppt/presentation.xml><?xml version="1.0" encoding="utf-8"?>
-<p:presentation xmlns:a="http://schemas.openxmlformats.org/drawingml/2006/main" xmlns:r="http://schemas.openxmlformats.org/officeDocument/2006/relationships" xmlns:p="http://schemas.openxmlformats.org/presentationml/2006/main" saveSubsetFonts="1" autoCompressPictures="0">
+<p:presentation xmlns:a="http://schemas.openxmlformats.org/drawingml/2006/main" xmlns:p="http://schemas.openxmlformats.org/presentationml/2006/main" xmlns:r="http://schemas.openxmlformats.org/officeDocument/2006/relationships" autoCompressPictures="0" saveSubsetFonts="1">
   <p:sldMasterIdLst>
     <p:sldMasterId id="2147483648" r:id="rId1"/>
   </p:sldMasterIdLst>
@@ -47,8 +47,8 @@
     <a:defPPr>
       <a:defRPr lang="en-US"/>
     </a:defPPr>
-    <a:lvl1pPr marL="0" algn="l" defTabSz="457200" rtl="0" eaLnBrk="1" latinLnBrk="0" hangingPunct="1">
-      <a:defRPr sz="1800" kern="1200">
+    <a:lvl1pPr algn="l" defTabSz="457200" eaLnBrk="1" hangingPunct="1" latinLnBrk="0" marL="0" rtl="0">
+      <a:defRPr kern="1200" sz="1800">
         <a:solidFill>
           <a:schemeClr val="tx1"/>
         </a:solidFill>
@@ -57,8 +57,8 @@
         <a:cs typeface="+mn-cs"/>
       </a:defRPr>
     </a:lvl1pPr>
-    <a:lvl2pPr marL="457200" algn="l" defTabSz="457200" rtl="0" eaLnBrk="1" latinLnBrk="0" hangingPunct="1">
-      <a:defRPr sz="1800" kern="1200">
+    <a:lvl2pPr algn="l" defTabSz="457200" eaLnBrk="1" hangingPunct="1" latinLnBrk="0" marL="457200" rtl="0">
+      <a:defRPr kern="1200" sz="1800">
         <a:solidFill>
           <a:schemeClr val="tx1"/>
         </a:solidFill>
@@ -67,8 +67,8 @@
         <a:cs typeface="+mn-cs"/>
       </a:defRPr>
     </a:lvl2pPr>
-    <a:lvl3pPr marL="914400" algn="l" defTabSz="457200" rtl="0" eaLnBrk="1" latinLnBrk="0" hangingPunct="1">
-      <a:defRPr sz="1800" kern="1200">
+    <a:lvl3pPr algn="l" defTabSz="457200" eaLnBrk="1" hangingPunct="1" latinLnBrk="0" marL="914400" rtl="0">
+      <a:defRPr kern="1200" sz="1800">
         <a:solidFill>
           <a:schemeClr val="tx1"/>
         </a:solidFill>
@@ -77,8 +77,8 @@
         <a:cs typeface="+mn-cs"/>
       </a:defRPr>
     </a:lvl3pPr>
-    <a:lvl4pPr marL="1371600" algn="l" defTabSz="457200" rtl="0" eaLnBrk="1" latinLnBrk="0" hangingPunct="1">
-      <a:defRPr sz="1800" kern="1200">
+    <a:lvl4pPr algn="l" defTabSz="457200" eaLnBrk="1" hangingPunct="1" latinLnBrk="0" marL="1371600" rtl="0">
+      <a:defRPr kern="1200" sz="1800">
         <a:solidFill>
           <a:schemeClr val="tx1"/>
         </a:solidFill>
@@ -87,8 +87,8 @@
         <a:cs typeface="+mn-cs"/>
       </a:defRPr>
     </a:lvl4pPr>
-    <a:lvl5pPr marL="1828800" algn="l" defTabSz="457200" rtl="0" eaLnBrk="1" latinLnBrk="0" hangingPunct="1">
-      <a:defRPr sz="1800" kern="1200">
+    <a:lvl5pPr algn="l" defTabSz="457200" eaLnBrk="1" hangingPunct="1" latinLnBrk="0" marL="1828800" rtl="0">
+      <a:defRPr kern="1200" sz="1800">
         <a:solidFill>
           <a:schemeClr val="tx1"/>
         </a:solidFill>
@@ -97,8 +97,8 @@
         <a:cs typeface="+mn-cs"/>
       </a:defRPr>
     </a:lvl5pPr>
-    <a:lvl6pPr marL="2286000" algn="l" defTabSz="457200" rtl="0" eaLnBrk="1" latinLnBrk="0" hangingPunct="1">
-      <a:defRPr sz="1800" kern="1200">
+    <a:lvl6pPr algn="l" defTabSz="457200" eaLnBrk="1" hangingPunct="1" latinLnBrk="0" marL="2286000" rtl="0">
+      <a:defRPr kern="1200" sz="1800">
         <a:solidFill>
           <a:schemeClr val="tx1"/>
         </a:solidFill>
@@ -107,8 +107,8 @@
         <a:cs typeface="+mn-cs"/>
       </a:defRPr>
     </a:lvl6pPr>
-    <a:lvl7pPr marL="2743200" algn="l" defTabSz="457200" rtl="0" eaLnBrk="1" latinLnBrk="0" hangingPunct="1">
-      <a:defRPr sz="1800" kern="1200">
+    <a:lvl7pPr algn="l" defTabSz="457200" eaLnBrk="1" hangingPunct="1" latinLnBrk="0" marL="2743200" rtl="0">
+      <a:defRPr kern="1200" sz="1800">
         <a:solidFill>
           <a:schemeClr val="tx1"/>
         </a:solidFill>
@@ -117,8 +117,8 @@
         <a:cs typeface="+mn-cs"/>
       </a:defRPr>
     </a:lvl7pPr>
-    <a:lvl8pPr marL="3200400" algn="l" defTabSz="457200" rtl="0" eaLnBrk="1" latinLnBrk="0" hangingPunct="1">
-      <a:defRPr sz="1800" kern="1200">
+    <a:lvl8pPr algn="l" defTabSz="457200" eaLnBrk="1" hangingPunct="1" latinLnBrk="0" marL="3200400" rtl="0">
+      <a:defRPr kern="1200" sz="1800">
         <a:solidFill>
           <a:schemeClr val="tx1"/>
         </a:solidFill>
@@ -127,8 +127,8 @@
         <a:cs typeface="+mn-cs"/>
       </a:defRPr>
     </a:lvl8pPr>
-    <a:lvl9pPr marL="3657600" algn="l" defTabSz="457200" rtl="0" eaLnBrk="1" latinLnBrk="0" hangingPunct="1">
-      <a:defRPr sz="1800" kern="1200">
+    <a:lvl9pPr algn="l" defTabSz="457200" eaLnBrk="1" hangingPunct="1" latinLnBrk="0" marL="3657600" rtl="0">
+      <a:defRPr kern="1200" sz="1800">
         <a:solidFill>
           <a:schemeClr val="tx1"/>
         </a:solidFill>
@@ -57760,7 +57760,7 @@
             <a:spLocks noGrp="1"/>
           </p:cNvSpPr>
           <p:nvPr>
-            <p:ph type="subTitle" idx="1"/>
+            <p:ph idx="1" type="subTitle"/>
           </p:nvPr>
         </p:nvSpPr>
         <p:spPr>

</xml_diff>